<commit_message>
final repo commit with visualizations, ppt, report
</commit_message>
<xml_diff>
--- a/PBDA_Project.pptx
+++ b/PBDA_Project.pptx
@@ -14,8 +14,21 @@
     <p:sldId id="269" r:id="rId8"/>
     <p:sldId id="264" r:id="rId9"/>
     <p:sldId id="261" r:id="rId10"/>
-    <p:sldId id="262" r:id="rId11"/>
-    <p:sldId id="263" r:id="rId12"/>
+    <p:sldId id="271" r:id="rId11"/>
+    <p:sldId id="262" r:id="rId12"/>
+    <p:sldId id="270" r:id="rId13"/>
+    <p:sldId id="263" r:id="rId14"/>
+    <p:sldId id="272" r:id="rId15"/>
+    <p:sldId id="273" r:id="rId16"/>
+    <p:sldId id="274" r:id="rId17"/>
+    <p:sldId id="275" r:id="rId18"/>
+    <p:sldId id="276" r:id="rId19"/>
+    <p:sldId id="277" r:id="rId20"/>
+    <p:sldId id="278" r:id="rId21"/>
+    <p:sldId id="279" r:id="rId22"/>
+    <p:sldId id="280" r:id="rId23"/>
+    <p:sldId id="281" r:id="rId24"/>
+    <p:sldId id="282" r:id="rId25"/>
   </p:sldIdLst>
   <p:sldSz cx="12192000" cy="6858000"/>
   <p:notesSz cx="6858000" cy="9144000"/>
@@ -120,6 +133,10 @@
     </p:ext>
   </p:extLst>
 </p:presentation>
+</file>
+
+<file path=ppt/revisionInfo.xml><?xml version="1.0" encoding="utf-8"?>
+<p1510:revInfo xmlns:a="http://schemas.openxmlformats.org/drawingml/2006/main" xmlns:r="http://schemas.openxmlformats.org/officeDocument/2006/relationships" xmlns:p1510="http://schemas.microsoft.com/office/powerpoint/2015/10/main"/>
 </file>
 
 <file path=ppt/slideLayouts/slideLayout1.xml><?xml version="1.0" encoding="utf-8"?>
@@ -305,7 +322,7 @@
           </a:lstStyle>
           <a:p>
             <a:r>
-              <a:rPr lang="en-US" smtClean="0"/>
+              <a:rPr lang="en-US"/>
               <a:t>Click to edit Master title style</a:t>
             </a:r>
             <a:endParaRPr lang="en-US" dirty="0"/>
@@ -424,7 +441,7 @@
           </a:lstStyle>
           <a:p>
             <a:r>
-              <a:rPr lang="en-US" smtClean="0"/>
+              <a:rPr lang="en-US"/>
               <a:t>Click to edit Master subtitle style</a:t>
             </a:r>
             <a:endParaRPr lang="en-US" dirty="0"/>
@@ -598,7 +615,7 @@
           </a:lstStyle>
           <a:p>
             <a:r>
-              <a:rPr lang="en-US" smtClean="0"/>
+              <a:rPr lang="en-US"/>
               <a:t>Click to edit Master title style</a:t>
             </a:r>
             <a:endParaRPr lang="en-US" dirty="0"/>
@@ -686,7 +703,7 @@
           </a:lstStyle>
           <a:p>
             <a:r>
-              <a:rPr lang="en-US" smtClean="0"/>
+              <a:rPr lang="en-US"/>
               <a:t>Click icon to add picture</a:t>
             </a:r>
             <a:endParaRPr lang="en-US" dirty="0"/>
@@ -754,7 +771,7 @@
           <a:p>
             <a:pPr lvl="0"/>
             <a:r>
-              <a:rPr lang="en-US" smtClean="0"/>
+              <a:rPr lang="en-US"/>
               <a:t>Click to edit Master text styles</a:t>
             </a:r>
           </a:p>
@@ -882,7 +899,7 @@
           </a:lstStyle>
           <a:p>
             <a:r>
-              <a:rPr lang="en-US" smtClean="0"/>
+              <a:rPr lang="en-US"/>
               <a:t>Click to edit Master title style</a:t>
             </a:r>
             <a:endParaRPr lang="en-US" dirty="0"/>
@@ -1002,7 +1019,7 @@
           <a:p>
             <a:pPr lvl="0"/>
             <a:r>
-              <a:rPr lang="en-US" smtClean="0"/>
+              <a:rPr lang="en-US"/>
               <a:t>Click to edit Master text styles</a:t>
             </a:r>
           </a:p>
@@ -1165,7 +1182,7 @@
           </a:lstStyle>
           <a:p>
             <a:r>
-              <a:rPr lang="en-US" smtClean="0"/>
+              <a:rPr lang="en-US"/>
               <a:t>Click to edit Master title style</a:t>
             </a:r>
             <a:endParaRPr lang="en-US" dirty="0"/>
@@ -1222,7 +1239,7 @@
           <a:p>
             <a:pPr lvl="0"/>
             <a:r>
-              <a:rPr lang="en-US" smtClean="0"/>
+              <a:rPr lang="en-US"/>
               <a:t>Click to edit Master text styles</a:t>
             </a:r>
           </a:p>
@@ -1341,7 +1358,7 @@
           <a:p>
             <a:pPr lvl="0"/>
             <a:r>
-              <a:rPr lang="en-US" smtClean="0"/>
+              <a:rPr lang="en-US"/>
               <a:t>Click to edit Master text styles</a:t>
             </a:r>
           </a:p>
@@ -1568,7 +1585,7 @@
           </a:lstStyle>
           <a:p>
             <a:r>
-              <a:rPr lang="en-US" smtClean="0"/>
+              <a:rPr lang="en-US"/>
               <a:t>Click to edit Master title style</a:t>
             </a:r>
             <a:endParaRPr lang="en-US" dirty="0"/>
@@ -1688,7 +1705,7 @@
           <a:p>
             <a:pPr lvl="0"/>
             <a:r>
-              <a:rPr lang="en-US" smtClean="0"/>
+              <a:rPr lang="en-US"/>
               <a:t>Click to edit Master text styles</a:t>
             </a:r>
           </a:p>
@@ -1820,7 +1837,7 @@
           </a:lstStyle>
           <a:p>
             <a:r>
-              <a:rPr lang="en-US" smtClean="0"/>
+              <a:rPr lang="en-US"/>
               <a:t>Click to edit Master title style</a:t>
             </a:r>
             <a:endParaRPr lang="en-US" dirty="0"/>
@@ -1943,7 +1960,7 @@
           <a:p>
             <a:pPr lvl="0"/>
             <a:r>
-              <a:rPr lang="en-US" smtClean="0"/>
+              <a:rPr lang="en-US"/>
               <a:t>Click to edit Master text styles</a:t>
             </a:r>
           </a:p>
@@ -2062,7 +2079,7 @@
           <a:p>
             <a:pPr lvl="0"/>
             <a:r>
-              <a:rPr lang="en-US" smtClean="0"/>
+              <a:rPr lang="en-US"/>
               <a:t>Click to edit Master text styles</a:t>
             </a:r>
           </a:p>
@@ -2290,7 +2307,7 @@
           <a:p>
             <a:pPr marL="0" lvl="0"/>
             <a:r>
-              <a:rPr lang="en-US" smtClean="0"/>
+              <a:rPr lang="en-US"/>
               <a:t>Click to edit Master title style</a:t>
             </a:r>
             <a:endParaRPr lang="en-US" dirty="0"/>
@@ -2413,7 +2430,7 @@
           <a:p>
             <a:pPr lvl="0"/>
             <a:r>
-              <a:rPr lang="en-US" smtClean="0"/>
+              <a:rPr lang="en-US"/>
               <a:t>Click to edit Master text styles</a:t>
             </a:r>
           </a:p>
@@ -2532,7 +2549,7 @@
           <a:p>
             <a:pPr lvl="0"/>
             <a:r>
-              <a:rPr lang="en-US" smtClean="0"/>
+              <a:rPr lang="en-US"/>
               <a:t>Click to edit Master text styles</a:t>
             </a:r>
           </a:p>
@@ -2684,7 +2701,7 @@
           </a:lstStyle>
           <a:p>
             <a:r>
-              <a:rPr lang="en-US" smtClean="0"/>
+              <a:rPr lang="en-US"/>
               <a:t>Click to edit Master title style</a:t>
             </a:r>
             <a:endParaRPr lang="en-US" dirty="0"/>
@@ -2708,35 +2725,35 @@
           <a:p>
             <a:pPr lvl="0"/>
             <a:r>
-              <a:rPr lang="en-US" smtClean="0"/>
+              <a:rPr lang="en-US"/>
               <a:t>Click to edit Master text styles</a:t>
             </a:r>
           </a:p>
           <a:p>
             <a:pPr lvl="1"/>
             <a:r>
-              <a:rPr lang="en-US" smtClean="0"/>
+              <a:rPr lang="en-US"/>
               <a:t>Second level</a:t>
             </a:r>
           </a:p>
           <a:p>
             <a:pPr lvl="2"/>
             <a:r>
-              <a:rPr lang="en-US" smtClean="0"/>
+              <a:rPr lang="en-US"/>
               <a:t>Third level</a:t>
             </a:r>
           </a:p>
           <a:p>
             <a:pPr lvl="3"/>
             <a:r>
-              <a:rPr lang="en-US" smtClean="0"/>
+              <a:rPr lang="en-US"/>
               <a:t>Fourth level</a:t>
             </a:r>
           </a:p>
           <a:p>
             <a:pPr lvl="4"/>
             <a:r>
-              <a:rPr lang="en-US" smtClean="0"/>
+              <a:rPr lang="en-US"/>
               <a:t>Fifth level</a:t>
             </a:r>
             <a:endParaRPr lang="en-US" dirty="0"/>
@@ -2890,7 +2907,7 @@
           <a:lstStyle/>
           <a:p>
             <a:r>
-              <a:rPr lang="en-US" smtClean="0"/>
+              <a:rPr lang="en-US"/>
               <a:t>Click to edit Master title style</a:t>
             </a:r>
             <a:endParaRPr lang="en-US" dirty="0"/>
@@ -2919,35 +2936,35 @@
           <a:p>
             <a:pPr lvl="0"/>
             <a:r>
-              <a:rPr lang="en-US" smtClean="0"/>
+              <a:rPr lang="en-US"/>
               <a:t>Click to edit Master text styles</a:t>
             </a:r>
           </a:p>
           <a:p>
             <a:pPr lvl="1"/>
             <a:r>
-              <a:rPr lang="en-US" smtClean="0"/>
+              <a:rPr lang="en-US"/>
               <a:t>Second level</a:t>
             </a:r>
           </a:p>
           <a:p>
             <a:pPr lvl="2"/>
             <a:r>
-              <a:rPr lang="en-US" smtClean="0"/>
+              <a:rPr lang="en-US"/>
               <a:t>Third level</a:t>
             </a:r>
           </a:p>
           <a:p>
             <a:pPr lvl="3"/>
             <a:r>
-              <a:rPr lang="en-US" smtClean="0"/>
+              <a:rPr lang="en-US"/>
               <a:t>Fourth level</a:t>
             </a:r>
           </a:p>
           <a:p>
             <a:pPr lvl="4"/>
             <a:r>
-              <a:rPr lang="en-US" smtClean="0"/>
+              <a:rPr lang="en-US"/>
               <a:t>Fifth level</a:t>
             </a:r>
             <a:endParaRPr lang="en-US" dirty="0"/>
@@ -3127,7 +3144,7 @@
           <a:lstStyle/>
           <a:p>
             <a:r>
-              <a:rPr lang="en-US" smtClean="0"/>
+              <a:rPr lang="en-US"/>
               <a:t>Click to edit Master title style</a:t>
             </a:r>
             <a:endParaRPr lang="en-US" dirty="0"/>
@@ -3151,35 +3168,35 @@
           <a:p>
             <a:pPr lvl="0"/>
             <a:r>
-              <a:rPr lang="en-US" smtClean="0"/>
+              <a:rPr lang="en-US"/>
               <a:t>Click to edit Master text styles</a:t>
             </a:r>
           </a:p>
           <a:p>
             <a:pPr lvl="1"/>
             <a:r>
-              <a:rPr lang="en-US" smtClean="0"/>
+              <a:rPr lang="en-US"/>
               <a:t>Second level</a:t>
             </a:r>
           </a:p>
           <a:p>
             <a:pPr lvl="2"/>
             <a:r>
-              <a:rPr lang="en-US" smtClean="0"/>
+              <a:rPr lang="en-US"/>
               <a:t>Third level</a:t>
             </a:r>
           </a:p>
           <a:p>
             <a:pPr lvl="3"/>
             <a:r>
-              <a:rPr lang="en-US" smtClean="0"/>
+              <a:rPr lang="en-US"/>
               <a:t>Fourth level</a:t>
             </a:r>
           </a:p>
           <a:p>
             <a:pPr lvl="4"/>
             <a:r>
-              <a:rPr lang="en-US" smtClean="0"/>
+              <a:rPr lang="en-US"/>
               <a:t>Fifth level</a:t>
             </a:r>
             <a:endParaRPr lang="en-US" dirty="0"/>
@@ -3308,7 +3325,7 @@
           </a:lstStyle>
           <a:p>
             <a:r>
-              <a:rPr lang="en-US" smtClean="0"/>
+              <a:rPr lang="en-US"/>
               <a:t>Click to edit Master title style</a:t>
             </a:r>
             <a:endParaRPr lang="en-US" dirty="0"/>
@@ -3428,7 +3445,7 @@
           <a:p>
             <a:pPr lvl="0"/>
             <a:r>
-              <a:rPr lang="en-US" smtClean="0"/>
+              <a:rPr lang="en-US"/>
               <a:t>Click to edit Master text styles</a:t>
             </a:r>
           </a:p>
@@ -3607,7 +3624,7 @@
           <a:lstStyle/>
           <a:p>
             <a:r>
-              <a:rPr lang="en-US" smtClean="0"/>
+              <a:rPr lang="en-US"/>
               <a:t>Click to edit Master title style</a:t>
             </a:r>
             <a:endParaRPr lang="en-US" dirty="0"/>
@@ -3638,35 +3655,35 @@
           <a:p>
             <a:pPr lvl="0"/>
             <a:r>
-              <a:rPr lang="en-US" smtClean="0"/>
+              <a:rPr lang="en-US"/>
               <a:t>Click to edit Master text styles</a:t>
             </a:r>
           </a:p>
           <a:p>
             <a:pPr lvl="1"/>
             <a:r>
-              <a:rPr lang="en-US" smtClean="0"/>
+              <a:rPr lang="en-US"/>
               <a:t>Second level</a:t>
             </a:r>
           </a:p>
           <a:p>
             <a:pPr lvl="2"/>
             <a:r>
-              <a:rPr lang="en-US" smtClean="0"/>
+              <a:rPr lang="en-US"/>
               <a:t>Third level</a:t>
             </a:r>
           </a:p>
           <a:p>
             <a:pPr lvl="3"/>
             <a:r>
-              <a:rPr lang="en-US" smtClean="0"/>
+              <a:rPr lang="en-US"/>
               <a:t>Fourth level</a:t>
             </a:r>
           </a:p>
           <a:p>
             <a:pPr lvl="4"/>
             <a:r>
-              <a:rPr lang="en-US" smtClean="0"/>
+              <a:rPr lang="en-US"/>
               <a:t>Fifth level</a:t>
             </a:r>
             <a:endParaRPr lang="en-US" dirty="0"/>
@@ -3697,35 +3714,35 @@
           <a:p>
             <a:pPr lvl="0"/>
             <a:r>
-              <a:rPr lang="en-US" smtClean="0"/>
+              <a:rPr lang="en-US"/>
               <a:t>Click to edit Master text styles</a:t>
             </a:r>
           </a:p>
           <a:p>
             <a:pPr lvl="1"/>
             <a:r>
-              <a:rPr lang="en-US" smtClean="0"/>
+              <a:rPr lang="en-US"/>
               <a:t>Second level</a:t>
             </a:r>
           </a:p>
           <a:p>
             <a:pPr lvl="2"/>
             <a:r>
-              <a:rPr lang="en-US" smtClean="0"/>
+              <a:rPr lang="en-US"/>
               <a:t>Third level</a:t>
             </a:r>
           </a:p>
           <a:p>
             <a:pPr lvl="3"/>
             <a:r>
-              <a:rPr lang="en-US" smtClean="0"/>
+              <a:rPr lang="en-US"/>
               <a:t>Fourth level</a:t>
             </a:r>
           </a:p>
           <a:p>
             <a:pPr lvl="4"/>
             <a:r>
-              <a:rPr lang="en-US" smtClean="0"/>
+              <a:rPr lang="en-US"/>
               <a:t>Fifth level</a:t>
             </a:r>
             <a:endParaRPr lang="en-US" dirty="0"/>
@@ -3847,7 +3864,7 @@
           </a:lstStyle>
           <a:p>
             <a:r>
-              <a:rPr lang="en-US" smtClean="0"/>
+              <a:rPr lang="en-US"/>
               <a:t>Click to edit Master title style</a:t>
             </a:r>
             <a:endParaRPr lang="en-US" dirty="0"/>
@@ -3925,7 +3942,7 @@
           <a:p>
             <a:pPr lvl="0"/>
             <a:r>
-              <a:rPr lang="en-US" smtClean="0"/>
+              <a:rPr lang="en-US"/>
               <a:t>Click to edit Master text styles</a:t>
             </a:r>
           </a:p>
@@ -3955,35 +3972,35 @@
           <a:p>
             <a:pPr lvl="0"/>
             <a:r>
-              <a:rPr lang="en-US" smtClean="0"/>
+              <a:rPr lang="en-US"/>
               <a:t>Click to edit Master text styles</a:t>
             </a:r>
           </a:p>
           <a:p>
             <a:pPr lvl="1"/>
             <a:r>
-              <a:rPr lang="en-US" smtClean="0"/>
+              <a:rPr lang="en-US"/>
               <a:t>Second level</a:t>
             </a:r>
           </a:p>
           <a:p>
             <a:pPr lvl="2"/>
             <a:r>
-              <a:rPr lang="en-US" smtClean="0"/>
+              <a:rPr lang="en-US"/>
               <a:t>Third level</a:t>
             </a:r>
           </a:p>
           <a:p>
             <a:pPr lvl="3"/>
             <a:r>
-              <a:rPr lang="en-US" smtClean="0"/>
+              <a:rPr lang="en-US"/>
               <a:t>Fourth level</a:t>
             </a:r>
           </a:p>
           <a:p>
             <a:pPr lvl="4"/>
             <a:r>
-              <a:rPr lang="en-US" smtClean="0"/>
+              <a:rPr lang="en-US"/>
               <a:t>Fifth level</a:t>
             </a:r>
             <a:endParaRPr lang="en-US" dirty="0"/>
@@ -4061,7 +4078,7 @@
           <a:p>
             <a:pPr lvl="0"/>
             <a:r>
-              <a:rPr lang="en-US" smtClean="0"/>
+              <a:rPr lang="en-US"/>
               <a:t>Click to edit Master text styles</a:t>
             </a:r>
           </a:p>
@@ -4091,35 +4108,35 @@
           <a:p>
             <a:pPr lvl="0"/>
             <a:r>
-              <a:rPr lang="en-US" smtClean="0"/>
+              <a:rPr lang="en-US"/>
               <a:t>Click to edit Master text styles</a:t>
             </a:r>
           </a:p>
           <a:p>
             <a:pPr lvl="1"/>
             <a:r>
-              <a:rPr lang="en-US" smtClean="0"/>
+              <a:rPr lang="en-US"/>
               <a:t>Second level</a:t>
             </a:r>
           </a:p>
           <a:p>
             <a:pPr lvl="2"/>
             <a:r>
-              <a:rPr lang="en-US" smtClean="0"/>
+              <a:rPr lang="en-US"/>
               <a:t>Third level</a:t>
             </a:r>
           </a:p>
           <a:p>
             <a:pPr lvl="3"/>
             <a:r>
-              <a:rPr lang="en-US" smtClean="0"/>
+              <a:rPr lang="en-US"/>
               <a:t>Fourth level</a:t>
             </a:r>
           </a:p>
           <a:p>
             <a:pPr lvl="4"/>
             <a:r>
-              <a:rPr lang="en-US" smtClean="0"/>
+              <a:rPr lang="en-US"/>
               <a:t>Fifth level</a:t>
             </a:r>
             <a:endParaRPr lang="en-US" dirty="0"/>
@@ -4268,7 +4285,7 @@
           <a:lstStyle/>
           <a:p>
             <a:r>
-              <a:rPr lang="en-US" smtClean="0"/>
+              <a:rPr lang="en-US"/>
               <a:t>Click to edit Master title style</a:t>
             </a:r>
             <a:endParaRPr lang="en-US" dirty="0"/>
@@ -4523,7 +4540,7 @@
           </a:lstStyle>
           <a:p>
             <a:r>
-              <a:rPr lang="en-US" smtClean="0"/>
+              <a:rPr lang="en-US"/>
               <a:t>Click to edit Master title style</a:t>
             </a:r>
             <a:endParaRPr lang="en-US" dirty="0"/>
@@ -4554,35 +4571,35 @@
           <a:p>
             <a:pPr lvl="0"/>
             <a:r>
-              <a:rPr lang="en-US" smtClean="0"/>
+              <a:rPr lang="en-US"/>
               <a:t>Click to edit Master text styles</a:t>
             </a:r>
           </a:p>
           <a:p>
             <a:pPr lvl="1"/>
             <a:r>
-              <a:rPr lang="en-US" smtClean="0"/>
+              <a:rPr lang="en-US"/>
               <a:t>Second level</a:t>
             </a:r>
           </a:p>
           <a:p>
             <a:pPr lvl="2"/>
             <a:r>
-              <a:rPr lang="en-US" smtClean="0"/>
+              <a:rPr lang="en-US"/>
               <a:t>Third level</a:t>
             </a:r>
           </a:p>
           <a:p>
             <a:pPr lvl="3"/>
             <a:r>
-              <a:rPr lang="en-US" smtClean="0"/>
+              <a:rPr lang="en-US"/>
               <a:t>Fourth level</a:t>
             </a:r>
           </a:p>
           <a:p>
             <a:pPr lvl="4"/>
             <a:r>
-              <a:rPr lang="en-US" smtClean="0"/>
+              <a:rPr lang="en-US"/>
               <a:t>Fifth level</a:t>
             </a:r>
             <a:endParaRPr lang="en-US" dirty="0"/>
@@ -4650,7 +4667,7 @@
           <a:p>
             <a:pPr lvl="0"/>
             <a:r>
-              <a:rPr lang="en-US" smtClean="0"/>
+              <a:rPr lang="en-US"/>
               <a:t>Click to edit Master text styles</a:t>
             </a:r>
           </a:p>
@@ -4809,7 +4826,7 @@
           </a:lstStyle>
           <a:p>
             <a:r>
-              <a:rPr lang="en-US" smtClean="0"/>
+              <a:rPr lang="en-US"/>
               <a:t>Click to edit Master title style</a:t>
             </a:r>
             <a:endParaRPr lang="en-US" dirty="0"/>
@@ -4897,7 +4914,7 @@
           </a:lstStyle>
           <a:p>
             <a:r>
-              <a:rPr lang="en-US" smtClean="0"/>
+              <a:rPr lang="en-US"/>
               <a:t>Click icon to add picture</a:t>
             </a:r>
             <a:endParaRPr lang="en-US" dirty="0"/>
@@ -4965,7 +4982,7 @@
           <a:p>
             <a:pPr lvl="0"/>
             <a:r>
-              <a:rPr lang="en-US" smtClean="0"/>
+              <a:rPr lang="en-US"/>
               <a:t>Click to edit Master text styles</a:t>
             </a:r>
           </a:p>
@@ -5235,7 +5252,7 @@
           <a:lstStyle/>
           <a:p>
             <a:r>
-              <a:rPr lang="en-US" smtClean="0"/>
+              <a:rPr lang="en-US"/>
               <a:t>Click to edit Master title style</a:t>
             </a:r>
             <a:endParaRPr lang="en-US" dirty="0"/>
@@ -5269,35 +5286,35 @@
           <a:p>
             <a:pPr lvl="0"/>
             <a:r>
-              <a:rPr lang="en-US" smtClean="0"/>
+              <a:rPr lang="en-US"/>
               <a:t>Click to edit Master text styles</a:t>
             </a:r>
           </a:p>
           <a:p>
             <a:pPr lvl="1"/>
             <a:r>
-              <a:rPr lang="en-US" smtClean="0"/>
+              <a:rPr lang="en-US"/>
               <a:t>Second level</a:t>
             </a:r>
           </a:p>
           <a:p>
             <a:pPr lvl="2"/>
             <a:r>
-              <a:rPr lang="en-US" smtClean="0"/>
+              <a:rPr lang="en-US"/>
               <a:t>Third level</a:t>
             </a:r>
           </a:p>
           <a:p>
             <a:pPr lvl="3"/>
             <a:r>
-              <a:rPr lang="en-US" smtClean="0"/>
+              <a:rPr lang="en-US"/>
               <a:t>Fourth level</a:t>
             </a:r>
           </a:p>
           <a:p>
             <a:pPr lvl="4"/>
             <a:r>
-              <a:rPr lang="en-US" smtClean="0"/>
+              <a:rPr lang="en-US"/>
               <a:t>Fifth level</a:t>
             </a:r>
             <a:endParaRPr lang="en-US" dirty="0"/>
@@ -5901,17 +5918,16 @@
           <a:p>
             <a:pPr algn="ctr"/>
             <a:r>
-              <a:rPr lang="en-US" sz="6600" b="1" dirty="0" smtClean="0"/>
+              <a:rPr lang="en-US" sz="6600" b="1" dirty="0"/>
               <a:t>PBDA Project</a:t>
             </a:r>
             <a:br>
-              <a:rPr lang="en-US" sz="6600" b="1" dirty="0" smtClean="0"/>
+              <a:rPr lang="en-US" sz="6600" b="1" dirty="0"/>
             </a:br>
             <a:r>
-              <a:rPr lang="en-US" sz="6600" b="1" dirty="0" smtClean="0"/>
+              <a:rPr lang="en-US" sz="6600" b="1" dirty="0"/>
               <a:t>YouTube Video Analysis</a:t>
             </a:r>
-            <a:endParaRPr lang="en-US" sz="6600" b="1" dirty="0"/>
           </a:p>
         </p:txBody>
       </p:sp>
@@ -5934,7 +5950,7 @@
               <a:buNone/>
             </a:pPr>
             <a:r>
-              <a:rPr lang="en-US" sz="2800" b="1" u="sng" dirty="0" smtClean="0"/>
+              <a:rPr lang="en-US" sz="2800" b="1" u="sng" dirty="0"/>
               <a:t>Group Members</a:t>
             </a:r>
           </a:p>
@@ -5947,48 +5963,47 @@
           <a:p>
             <a:pPr algn="ctr"/>
             <a:r>
-              <a:rPr lang="en-US" sz="2000" dirty="0" smtClean="0"/>
+              <a:rPr lang="en-US" sz="2000" dirty="0"/>
               <a:t>Sagar Patel (sap590)</a:t>
             </a:r>
           </a:p>
           <a:p>
             <a:pPr algn="ctr"/>
             <a:r>
-              <a:rPr lang="en-US" sz="2000" dirty="0" err="1" smtClean="0"/>
+              <a:rPr lang="en-US" sz="2000" dirty="0" err="1"/>
               <a:t>Aakar</a:t>
             </a:r>
             <a:r>
-              <a:rPr lang="en-US" sz="2000" dirty="0" smtClean="0"/>
+              <a:rPr lang="en-US" sz="2000" dirty="0"/>
               <a:t> </a:t>
             </a:r>
             <a:r>
-              <a:rPr lang="en-US" sz="2000" dirty="0" err="1" smtClean="0"/>
+              <a:rPr lang="en-US" sz="2000" dirty="0" err="1"/>
               <a:t>Jinwala</a:t>
             </a:r>
             <a:r>
-              <a:rPr lang="en-US" sz="2000" dirty="0" smtClean="0"/>
+              <a:rPr lang="en-US" sz="2000" dirty="0"/>
               <a:t> (adj329)</a:t>
             </a:r>
           </a:p>
           <a:p>
             <a:pPr algn="ctr"/>
             <a:r>
-              <a:rPr lang="en-US" sz="2000" dirty="0" err="1" smtClean="0"/>
+              <a:rPr lang="en-US" sz="2000" dirty="0" err="1"/>
               <a:t>Sanket</a:t>
             </a:r>
             <a:r>
-              <a:rPr lang="en-US" sz="2000" dirty="0" smtClean="0"/>
+              <a:rPr lang="en-US" sz="2000" dirty="0"/>
               <a:t> </a:t>
             </a:r>
             <a:r>
-              <a:rPr lang="en-US" sz="2000" dirty="0" err="1" smtClean="0"/>
+              <a:rPr lang="en-US" sz="2000" dirty="0" err="1"/>
               <a:t>Nawale</a:t>
             </a:r>
             <a:r>
-              <a:rPr lang="en-US" sz="2000" dirty="0" smtClean="0"/>
+              <a:rPr lang="en-US" sz="2000" dirty="0"/>
               <a:t> (skn288) </a:t>
             </a:r>
-            <a:endParaRPr lang="en-US" sz="2000" dirty="0"/>
           </a:p>
         </p:txBody>
       </p:sp>
@@ -6002,13 +6017,6 @@
   <p:clrMapOvr>
     <a:masterClrMapping/>
   </p:clrMapOvr>
-  <p:timing>
-    <p:tnLst>
-      <p:par>
-        <p:cTn id="1" dur="indefinite" restart="never" nodeType="tmRoot"/>
-      </p:par>
-    </p:tnLst>
-  </p:timing>
 </p:sld>
 </file>
 
@@ -6039,64 +6047,63 @@
             <p:ph type="title"/>
           </p:nvPr>
         </p:nvSpPr>
-        <p:spPr/>
+        <p:spPr>
+          <a:xfrm>
+            <a:off x="1281955" y="635031"/>
+            <a:ext cx="9601196" cy="1303867"/>
+          </a:xfrm>
+        </p:spPr>
         <p:txBody>
           <a:bodyPr/>
           <a:lstStyle/>
           <a:p>
             <a:r>
-              <a:rPr lang="en-US" dirty="0" smtClean="0"/>
-              <a:t>Visualization 2</a:t>
-            </a:r>
-            <a:endParaRPr lang="en-US" dirty="0"/>
-          </a:p>
-        </p:txBody>
-      </p:sp>
-      <p:sp>
-        <p:nvSpPr>
-          <p:cNvPr id="3" name="Content Placeholder 2"/>
-          <p:cNvSpPr>
-            <a:spLocks noGrp="1"/>
-          </p:cNvSpPr>
-          <p:nvPr>
-            <p:ph idx="4294967295"/>
-          </p:nvPr>
-        </p:nvSpPr>
+              <a:rPr lang="en-US" dirty="0"/>
+              <a:t>Visualization 1</a:t>
+            </a:r>
+          </a:p>
+        </p:txBody>
+      </p:sp>
+      <p:pic>
+        <p:nvPicPr>
+          <p:cNvPr id="3" name="Picture 2"/>
+          <p:cNvPicPr>
+            <a:picLocks noChangeAspect="1"/>
+          </p:cNvPicPr>
+          <p:nvPr/>
+        </p:nvPicPr>
+        <p:blipFill>
+          <a:blip r:embed="rId2">
+            <a:extLst>
+              <a:ext uri="{28A0092B-C50C-407E-A947-70E740481C1C}">
+                <a14:useLocalDpi xmlns:a14="http://schemas.microsoft.com/office/drawing/2010/main" val="0"/>
+              </a:ext>
+            </a:extLst>
+          </a:blip>
+          <a:stretch>
+            <a:fillRect/>
+          </a:stretch>
+        </p:blipFill>
         <p:spPr>
           <a:xfrm>
-            <a:off x="1169894" y="1938898"/>
-            <a:ext cx="9601200" cy="3317875"/>
-          </a:xfrm>
-        </p:spPr>
-        <p:txBody>
-          <a:bodyPr/>
-          <a:lstStyle/>
-          <a:p>
-            <a:r>
-              <a:rPr lang="en-US" dirty="0" smtClean="0"/>
-              <a:t>Trending Category</a:t>
-            </a:r>
-            <a:endParaRPr lang="en-US" dirty="0"/>
-          </a:p>
-        </p:txBody>
-      </p:sp>
+            <a:off x="318552" y="201706"/>
+            <a:ext cx="11528001" cy="6484501"/>
+          </a:xfrm>
+          <a:prstGeom prst="rect">
+            <a:avLst/>
+          </a:prstGeom>
+        </p:spPr>
+      </p:pic>
     </p:spTree>
     <p:extLst>
       <p:ext uri="{BB962C8B-B14F-4D97-AF65-F5344CB8AC3E}">
-        <p14:creationId xmlns:p14="http://schemas.microsoft.com/office/powerpoint/2010/main" val="4264535996"/>
+        <p14:creationId xmlns:p14="http://schemas.microsoft.com/office/powerpoint/2010/main" val="770428392"/>
       </p:ext>
     </p:extLst>
   </p:cSld>
   <p:clrMapOvr>
     <a:masterClrMapping/>
   </p:clrMapOvr>
-  <p:timing>
-    <p:tnLst>
-      <p:par>
-        <p:cTn id="1" dur="indefinite" restart="never" nodeType="tmRoot"/>
-      </p:par>
-    </p:tnLst>
-  </p:timing>
 </p:sld>
 </file>
 
@@ -6124,6 +6131,80 @@
             <a:spLocks noGrp="1"/>
           </p:cNvSpPr>
           <p:nvPr>
+            <p:ph type="ctrTitle"/>
+          </p:nvPr>
+        </p:nvSpPr>
+        <p:spPr/>
+        <p:txBody>
+          <a:bodyPr/>
+          <a:lstStyle/>
+          <a:p>
+            <a:r>
+              <a:rPr lang="en-US" dirty="0"/>
+              <a:t>Visualization 2</a:t>
+            </a:r>
+          </a:p>
+        </p:txBody>
+      </p:sp>
+      <p:sp>
+        <p:nvSpPr>
+          <p:cNvPr id="3" name="Content Placeholder 2"/>
+          <p:cNvSpPr>
+            <a:spLocks noGrp="1"/>
+          </p:cNvSpPr>
+          <p:nvPr>
+            <p:ph type="subTitle" idx="1"/>
+          </p:nvPr>
+        </p:nvSpPr>
+        <p:spPr/>
+        <p:txBody>
+          <a:bodyPr/>
+          <a:lstStyle/>
+          <a:p>
+            <a:r>
+              <a:rPr lang="en-US" dirty="0"/>
+              <a:t>Trending Category</a:t>
+            </a:r>
+          </a:p>
+        </p:txBody>
+      </p:sp>
+    </p:spTree>
+    <p:extLst>
+      <p:ext uri="{BB962C8B-B14F-4D97-AF65-F5344CB8AC3E}">
+        <p14:creationId xmlns:p14="http://schemas.microsoft.com/office/powerpoint/2010/main" val="4264535996"/>
+      </p:ext>
+    </p:extLst>
+  </p:cSld>
+  <p:clrMapOvr>
+    <a:masterClrMapping/>
+  </p:clrMapOvr>
+</p:sld>
+</file>
+
+<file path=ppt/slides/slide12.xml><?xml version="1.0" encoding="utf-8"?>
+<p:sld xmlns:a="http://schemas.openxmlformats.org/drawingml/2006/main" xmlns:r="http://schemas.openxmlformats.org/officeDocument/2006/relationships" xmlns:p="http://schemas.openxmlformats.org/presentationml/2006/main">
+  <p:cSld>
+    <p:spTree>
+      <p:nvGrpSpPr>
+        <p:cNvPr id="1" name=""/>
+        <p:cNvGrpSpPr/>
+        <p:nvPr/>
+      </p:nvGrpSpPr>
+      <p:grpSpPr>
+        <a:xfrm>
+          <a:off x="0" y="0"/>
+          <a:ext cx="0" cy="0"/>
+          <a:chOff x="0" y="0"/>
+          <a:chExt cx="0" cy="0"/>
+        </a:xfrm>
+      </p:grpSpPr>
+      <p:sp>
+        <p:nvSpPr>
+          <p:cNvPr id="2" name="Title 1"/>
+          <p:cNvSpPr>
+            <a:spLocks noGrp="1"/>
+          </p:cNvSpPr>
+          <p:nvPr>
             <p:ph type="title"/>
           </p:nvPr>
         </p:nvSpPr>
@@ -6133,10 +6214,118 @@
           <a:lstStyle/>
           <a:p>
             <a:r>
-              <a:rPr lang="en-US" dirty="0" smtClean="0"/>
+              <a:rPr lang="en-US" dirty="0"/>
+              <a:t>Visualization 2</a:t>
+            </a:r>
+          </a:p>
+        </p:txBody>
+      </p:sp>
+      <p:sp>
+        <p:nvSpPr>
+          <p:cNvPr id="3" name="Content Placeholder 2"/>
+          <p:cNvSpPr>
+            <a:spLocks noGrp="1"/>
+          </p:cNvSpPr>
+          <p:nvPr>
+            <p:ph idx="4294967295"/>
+          </p:nvPr>
+        </p:nvSpPr>
+        <p:spPr>
+          <a:xfrm>
+            <a:off x="1169894" y="1938898"/>
+            <a:ext cx="9601200" cy="3317875"/>
+          </a:xfrm>
+        </p:spPr>
+        <p:txBody>
+          <a:bodyPr/>
+          <a:lstStyle/>
+          <a:p>
+            <a:r>
+              <a:rPr lang="en-US" dirty="0"/>
+              <a:t>Trending Category</a:t>
+            </a:r>
+          </a:p>
+        </p:txBody>
+      </p:sp>
+      <p:pic>
+        <p:nvPicPr>
+          <p:cNvPr id="4" name="Picture 3"/>
+          <p:cNvPicPr>
+            <a:picLocks noChangeAspect="1"/>
+          </p:cNvPicPr>
+          <p:nvPr/>
+        </p:nvPicPr>
+        <p:blipFill>
+          <a:blip r:embed="rId2">
+            <a:extLst>
+              <a:ext uri="{28A0092B-C50C-407E-A947-70E740481C1C}">
+                <a14:useLocalDpi xmlns:a14="http://schemas.microsoft.com/office/drawing/2010/main" val="0"/>
+              </a:ext>
+            </a:extLst>
+          </a:blip>
+          <a:stretch>
+            <a:fillRect/>
+          </a:stretch>
+        </p:blipFill>
+        <p:spPr>
+          <a:xfrm>
+            <a:off x="470647" y="257176"/>
+            <a:ext cx="11256681" cy="6331884"/>
+          </a:xfrm>
+          <a:prstGeom prst="rect">
+            <a:avLst/>
+          </a:prstGeom>
+        </p:spPr>
+      </p:pic>
+    </p:spTree>
+    <p:extLst>
+      <p:ext uri="{BB962C8B-B14F-4D97-AF65-F5344CB8AC3E}">
+        <p14:creationId xmlns:p14="http://schemas.microsoft.com/office/powerpoint/2010/main" val="3774010192"/>
+      </p:ext>
+    </p:extLst>
+  </p:cSld>
+  <p:clrMapOvr>
+    <a:masterClrMapping/>
+  </p:clrMapOvr>
+</p:sld>
+</file>
+
+<file path=ppt/slides/slide13.xml><?xml version="1.0" encoding="utf-8"?>
+<p:sld xmlns:a="http://schemas.openxmlformats.org/drawingml/2006/main" xmlns:r="http://schemas.openxmlformats.org/officeDocument/2006/relationships" xmlns:p="http://schemas.openxmlformats.org/presentationml/2006/main">
+  <p:cSld>
+    <p:spTree>
+      <p:nvGrpSpPr>
+        <p:cNvPr id="1" name=""/>
+        <p:cNvGrpSpPr/>
+        <p:nvPr/>
+      </p:nvGrpSpPr>
+      <p:grpSpPr>
+        <a:xfrm>
+          <a:off x="0" y="0"/>
+          <a:ext cx="0" cy="0"/>
+          <a:chOff x="0" y="0"/>
+          <a:chExt cx="0" cy="0"/>
+        </a:xfrm>
+      </p:grpSpPr>
+      <p:sp>
+        <p:nvSpPr>
+          <p:cNvPr id="2" name="Title 1"/>
+          <p:cNvSpPr>
+            <a:spLocks noGrp="1"/>
+          </p:cNvSpPr>
+          <p:nvPr>
+            <p:ph type="ctrTitle"/>
+          </p:nvPr>
+        </p:nvSpPr>
+        <p:spPr/>
+        <p:txBody>
+          <a:bodyPr/>
+          <a:lstStyle/>
+          <a:p>
+            <a:r>
+              <a:rPr lang="en-US" dirty="0"/>
               <a:t>Visualization 3</a:t>
             </a:r>
-            <a:endParaRPr lang="en-US" dirty="0"/>
           </a:p>
         </p:txBody>
       </p:sp>
@@ -6147,7 +6336,7 @@
             <a:spLocks noGrp="1"/>
           </p:cNvSpPr>
           <p:nvPr>
-            <p:ph idx="1"/>
+            <p:ph type="subTitle" idx="1"/>
           </p:nvPr>
         </p:nvSpPr>
         <p:spPr/>
@@ -6155,11 +6344,14 @@
           <a:bodyPr/>
           <a:lstStyle/>
           <a:p>
-            <a:r>
-              <a:rPr lang="en-US" dirty="0" smtClean="0"/>
-              <a:t>Average views and likes across categories.</a:t>
-            </a:r>
-            <a:endParaRPr lang="en-US" dirty="0"/>
+            <a:pPr marL="457200" indent="-457200">
+              <a:buFont typeface="+mj-lt"/>
+              <a:buAutoNum type="arabicPeriod"/>
+            </a:pPr>
+            <a:r>
+              <a:rPr lang="en-US" dirty="0"/>
+              <a:t>Analysis of categories.</a:t>
+            </a:r>
           </a:p>
         </p:txBody>
       </p:sp>
@@ -6173,13 +6365,586 @@
   <p:clrMapOvr>
     <a:masterClrMapping/>
   </p:clrMapOvr>
-  <p:timing>
-    <p:tnLst>
-      <p:par>
-        <p:cTn id="1" dur="indefinite" restart="never" nodeType="tmRoot"/>
-      </p:par>
-    </p:tnLst>
-  </p:timing>
+</p:sld>
+</file>
+
+<file path=ppt/slides/slide14.xml><?xml version="1.0" encoding="utf-8"?>
+<p:sld xmlns:a="http://schemas.openxmlformats.org/drawingml/2006/main" xmlns:r="http://schemas.openxmlformats.org/officeDocument/2006/relationships" xmlns:p="http://schemas.openxmlformats.org/presentationml/2006/main">
+  <p:cSld>
+    <p:spTree>
+      <p:nvGrpSpPr>
+        <p:cNvPr id="1" name=""/>
+        <p:cNvGrpSpPr/>
+        <p:nvPr/>
+      </p:nvGrpSpPr>
+      <p:grpSpPr>
+        <a:xfrm>
+          <a:off x="0" y="0"/>
+          <a:ext cx="0" cy="0"/>
+          <a:chOff x="0" y="0"/>
+          <a:chExt cx="0" cy="0"/>
+        </a:xfrm>
+      </p:grpSpPr>
+      <p:sp>
+        <p:nvSpPr>
+          <p:cNvPr id="2" name="Title 1"/>
+          <p:cNvSpPr>
+            <a:spLocks noGrp="1"/>
+          </p:cNvSpPr>
+          <p:nvPr>
+            <p:ph type="title"/>
+          </p:nvPr>
+        </p:nvSpPr>
+        <p:spPr/>
+        <p:txBody>
+          <a:bodyPr/>
+          <a:lstStyle/>
+          <a:p>
+            <a:r>
+              <a:rPr lang="en-US" dirty="0"/>
+              <a:t>Visualization 3</a:t>
+            </a:r>
+          </a:p>
+        </p:txBody>
+      </p:sp>
+      <p:sp>
+        <p:nvSpPr>
+          <p:cNvPr id="3" name="Content Placeholder 2"/>
+          <p:cNvSpPr>
+            <a:spLocks noGrp="1"/>
+          </p:cNvSpPr>
+          <p:nvPr>
+            <p:ph idx="1"/>
+          </p:nvPr>
+        </p:nvSpPr>
+        <p:spPr/>
+        <p:txBody>
+          <a:bodyPr/>
+          <a:lstStyle/>
+          <a:p>
+            <a:pPr marL="457200" indent="-457200">
+              <a:buFont typeface="+mj-lt"/>
+              <a:buAutoNum type="arabicPeriod"/>
+            </a:pPr>
+            <a:r>
+              <a:rPr lang="en-US" dirty="0"/>
+              <a:t>Analysis of categories.</a:t>
+            </a:r>
+          </a:p>
+        </p:txBody>
+      </p:sp>
+      <p:pic>
+        <p:nvPicPr>
+          <p:cNvPr id="4" name="Picture 3"/>
+          <p:cNvPicPr>
+            <a:picLocks noChangeAspect="1"/>
+          </p:cNvPicPr>
+          <p:nvPr/>
+        </p:nvPicPr>
+        <p:blipFill>
+          <a:blip r:embed="rId2">
+            <a:extLst>
+              <a:ext uri="{28A0092B-C50C-407E-A947-70E740481C1C}">
+                <a14:useLocalDpi xmlns:a14="http://schemas.microsoft.com/office/drawing/2010/main" val="0"/>
+              </a:ext>
+            </a:extLst>
+          </a:blip>
+          <a:stretch>
+            <a:fillRect/>
+          </a:stretch>
+        </p:blipFill>
+        <p:spPr>
+          <a:xfrm>
+            <a:off x="268940" y="148758"/>
+            <a:ext cx="11640671" cy="6547877"/>
+          </a:xfrm>
+          <a:prstGeom prst="rect">
+            <a:avLst/>
+          </a:prstGeom>
+        </p:spPr>
+      </p:pic>
+    </p:spTree>
+    <p:extLst>
+      <p:ext uri="{BB962C8B-B14F-4D97-AF65-F5344CB8AC3E}">
+        <p14:creationId xmlns:p14="http://schemas.microsoft.com/office/powerpoint/2010/main" val="1749863111"/>
+      </p:ext>
+    </p:extLst>
+  </p:cSld>
+  <p:clrMapOvr>
+    <a:masterClrMapping/>
+  </p:clrMapOvr>
+</p:sld>
+</file>
+
+<file path=ppt/slides/slide15.xml><?xml version="1.0" encoding="utf-8"?>
+<p:sld xmlns:a="http://schemas.openxmlformats.org/drawingml/2006/main" xmlns:r="http://schemas.openxmlformats.org/officeDocument/2006/relationships" xmlns:p="http://schemas.openxmlformats.org/presentationml/2006/main">
+  <p:cSld>
+    <p:spTree>
+      <p:nvGrpSpPr>
+        <p:cNvPr id="1" name=""/>
+        <p:cNvGrpSpPr/>
+        <p:nvPr/>
+      </p:nvGrpSpPr>
+      <p:grpSpPr>
+        <a:xfrm>
+          <a:off x="0" y="0"/>
+          <a:ext cx="0" cy="0"/>
+          <a:chOff x="0" y="0"/>
+          <a:chExt cx="0" cy="0"/>
+        </a:xfrm>
+      </p:grpSpPr>
+      <p:sp>
+        <p:nvSpPr>
+          <p:cNvPr id="2" name="Title 1"/>
+          <p:cNvSpPr>
+            <a:spLocks noGrp="1"/>
+          </p:cNvSpPr>
+          <p:nvPr>
+            <p:ph type="ctrTitle"/>
+          </p:nvPr>
+        </p:nvSpPr>
+        <p:spPr/>
+        <p:txBody>
+          <a:bodyPr/>
+          <a:lstStyle/>
+          <a:p>
+            <a:r>
+              <a:rPr lang="en-US" dirty="0"/>
+              <a:t>Visualization 4</a:t>
+            </a:r>
+          </a:p>
+        </p:txBody>
+      </p:sp>
+      <p:sp>
+        <p:nvSpPr>
+          <p:cNvPr id="3" name="Content Placeholder 2"/>
+          <p:cNvSpPr>
+            <a:spLocks noGrp="1"/>
+          </p:cNvSpPr>
+          <p:nvPr>
+            <p:ph type="subTitle" idx="1"/>
+          </p:nvPr>
+        </p:nvSpPr>
+        <p:spPr/>
+        <p:txBody>
+          <a:bodyPr/>
+          <a:lstStyle/>
+          <a:p>
+            <a:r>
+              <a:rPr lang="en-US" dirty="0"/>
+              <a:t>Average views and likes across categories.</a:t>
+            </a:r>
+          </a:p>
+        </p:txBody>
+      </p:sp>
+    </p:spTree>
+    <p:extLst>
+      <p:ext uri="{BB962C8B-B14F-4D97-AF65-F5344CB8AC3E}">
+        <p14:creationId xmlns:p14="http://schemas.microsoft.com/office/powerpoint/2010/main" val="3447163412"/>
+      </p:ext>
+    </p:extLst>
+  </p:cSld>
+  <p:clrMapOvr>
+    <a:masterClrMapping/>
+  </p:clrMapOvr>
+</p:sld>
+</file>
+
+<file path=ppt/slides/slide16.xml><?xml version="1.0" encoding="utf-8"?>
+<p:sld xmlns:a="http://schemas.openxmlformats.org/drawingml/2006/main" xmlns:r="http://schemas.openxmlformats.org/officeDocument/2006/relationships" xmlns:p="http://schemas.openxmlformats.org/presentationml/2006/main">
+  <p:cSld>
+    <p:spTree>
+      <p:nvGrpSpPr>
+        <p:cNvPr id="1" name=""/>
+        <p:cNvGrpSpPr/>
+        <p:nvPr/>
+      </p:nvGrpSpPr>
+      <p:grpSpPr>
+        <a:xfrm>
+          <a:off x="0" y="0"/>
+          <a:ext cx="0" cy="0"/>
+          <a:chOff x="0" y="0"/>
+          <a:chExt cx="0" cy="0"/>
+        </a:xfrm>
+      </p:grpSpPr>
+      <p:sp>
+        <p:nvSpPr>
+          <p:cNvPr id="2" name="Title 1"/>
+          <p:cNvSpPr>
+            <a:spLocks noGrp="1"/>
+          </p:cNvSpPr>
+          <p:nvPr>
+            <p:ph type="title"/>
+          </p:nvPr>
+        </p:nvSpPr>
+        <p:spPr/>
+        <p:txBody>
+          <a:bodyPr/>
+          <a:lstStyle/>
+          <a:p>
+            <a:r>
+              <a:rPr lang="en-US" dirty="0"/>
+              <a:t>Visualization 4</a:t>
+            </a:r>
+          </a:p>
+        </p:txBody>
+      </p:sp>
+      <p:sp>
+        <p:nvSpPr>
+          <p:cNvPr id="3" name="Content Placeholder 2"/>
+          <p:cNvSpPr>
+            <a:spLocks noGrp="1"/>
+          </p:cNvSpPr>
+          <p:nvPr>
+            <p:ph idx="1"/>
+          </p:nvPr>
+        </p:nvSpPr>
+        <p:spPr/>
+        <p:txBody>
+          <a:bodyPr/>
+          <a:lstStyle/>
+          <a:p>
+            <a:r>
+              <a:rPr lang="en-US" dirty="0"/>
+              <a:t>Average views and likes across categories.</a:t>
+            </a:r>
+          </a:p>
+        </p:txBody>
+      </p:sp>
+      <p:pic>
+        <p:nvPicPr>
+          <p:cNvPr id="4" name="Picture 3"/>
+          <p:cNvPicPr>
+            <a:picLocks noChangeAspect="1"/>
+          </p:cNvPicPr>
+          <p:nvPr/>
+        </p:nvPicPr>
+        <p:blipFill>
+          <a:blip r:embed="rId2">
+            <a:extLst>
+              <a:ext uri="{28A0092B-C50C-407E-A947-70E740481C1C}">
+                <a14:useLocalDpi xmlns:a14="http://schemas.microsoft.com/office/drawing/2010/main" val="0"/>
+              </a:ext>
+            </a:extLst>
+          </a:blip>
+          <a:stretch>
+            <a:fillRect/>
+          </a:stretch>
+        </p:blipFill>
+        <p:spPr>
+          <a:xfrm>
+            <a:off x="431799" y="215153"/>
+            <a:ext cx="11450918" cy="6441141"/>
+          </a:xfrm>
+          <a:prstGeom prst="rect">
+            <a:avLst/>
+          </a:prstGeom>
+        </p:spPr>
+      </p:pic>
+    </p:spTree>
+    <p:extLst>
+      <p:ext uri="{BB962C8B-B14F-4D97-AF65-F5344CB8AC3E}">
+        <p14:creationId xmlns:p14="http://schemas.microsoft.com/office/powerpoint/2010/main" val="3699733450"/>
+      </p:ext>
+    </p:extLst>
+  </p:cSld>
+  <p:clrMapOvr>
+    <a:masterClrMapping/>
+  </p:clrMapOvr>
+</p:sld>
+</file>
+
+<file path=ppt/slides/slide17.xml><?xml version="1.0" encoding="utf-8"?>
+<p:sld xmlns:a="http://schemas.openxmlformats.org/drawingml/2006/main" xmlns:r="http://schemas.openxmlformats.org/officeDocument/2006/relationships" xmlns:p="http://schemas.openxmlformats.org/presentationml/2006/main">
+  <p:cSld>
+    <p:spTree>
+      <p:nvGrpSpPr>
+        <p:cNvPr id="1" name=""/>
+        <p:cNvGrpSpPr/>
+        <p:nvPr/>
+      </p:nvGrpSpPr>
+      <p:grpSpPr>
+        <a:xfrm>
+          <a:off x="0" y="0"/>
+          <a:ext cx="0" cy="0"/>
+          <a:chOff x="0" y="0"/>
+          <a:chExt cx="0" cy="0"/>
+        </a:xfrm>
+      </p:grpSpPr>
+      <p:sp>
+        <p:nvSpPr>
+          <p:cNvPr id="2" name="Title 1"/>
+          <p:cNvSpPr>
+            <a:spLocks noGrp="1"/>
+          </p:cNvSpPr>
+          <p:nvPr>
+            <p:ph type="ctrTitle"/>
+          </p:nvPr>
+        </p:nvSpPr>
+        <p:spPr/>
+        <p:txBody>
+          <a:bodyPr/>
+          <a:lstStyle/>
+          <a:p>
+            <a:r>
+              <a:rPr lang="en-US" dirty="0"/>
+              <a:t>Visualization 5</a:t>
+            </a:r>
+          </a:p>
+        </p:txBody>
+      </p:sp>
+      <p:sp>
+        <p:nvSpPr>
+          <p:cNvPr id="3" name="Content Placeholder 2"/>
+          <p:cNvSpPr>
+            <a:spLocks noGrp="1"/>
+          </p:cNvSpPr>
+          <p:nvPr>
+            <p:ph type="subTitle" idx="1"/>
+          </p:nvPr>
+        </p:nvSpPr>
+        <p:spPr/>
+        <p:txBody>
+          <a:bodyPr/>
+          <a:lstStyle/>
+          <a:p>
+            <a:pPr marL="457200" indent="-457200">
+              <a:buFont typeface="+mj-lt"/>
+              <a:buAutoNum type="arabicPeriod"/>
+            </a:pPr>
+            <a:r>
+              <a:rPr lang="en-US" dirty="0"/>
+              <a:t>Identifying Hot Tags for each Category.</a:t>
+            </a:r>
+          </a:p>
+        </p:txBody>
+      </p:sp>
+    </p:spTree>
+    <p:extLst>
+      <p:ext uri="{BB962C8B-B14F-4D97-AF65-F5344CB8AC3E}">
+        <p14:creationId xmlns:p14="http://schemas.microsoft.com/office/powerpoint/2010/main" val="1070241563"/>
+      </p:ext>
+    </p:extLst>
+  </p:cSld>
+  <p:clrMapOvr>
+    <a:masterClrMapping/>
+  </p:clrMapOvr>
+</p:sld>
+</file>
+
+<file path=ppt/slides/slide18.xml><?xml version="1.0" encoding="utf-8"?>
+<p:sld xmlns:a="http://schemas.openxmlformats.org/drawingml/2006/main" xmlns:r="http://schemas.openxmlformats.org/officeDocument/2006/relationships" xmlns:p="http://schemas.openxmlformats.org/presentationml/2006/main">
+  <p:cSld>
+    <p:spTree>
+      <p:nvGrpSpPr>
+        <p:cNvPr id="1" name=""/>
+        <p:cNvGrpSpPr/>
+        <p:nvPr/>
+      </p:nvGrpSpPr>
+      <p:grpSpPr>
+        <a:xfrm>
+          <a:off x="0" y="0"/>
+          <a:ext cx="0" cy="0"/>
+          <a:chOff x="0" y="0"/>
+          <a:chExt cx="0" cy="0"/>
+        </a:xfrm>
+      </p:grpSpPr>
+      <p:sp>
+        <p:nvSpPr>
+          <p:cNvPr id="2" name="Title 1"/>
+          <p:cNvSpPr>
+            <a:spLocks noGrp="1"/>
+          </p:cNvSpPr>
+          <p:nvPr>
+            <p:ph type="title"/>
+          </p:nvPr>
+        </p:nvSpPr>
+        <p:spPr/>
+        <p:txBody>
+          <a:bodyPr/>
+          <a:lstStyle/>
+          <a:p>
+            <a:r>
+              <a:rPr lang="en-US" dirty="0"/>
+              <a:t>Visualization 5</a:t>
+            </a:r>
+          </a:p>
+        </p:txBody>
+      </p:sp>
+      <p:sp>
+        <p:nvSpPr>
+          <p:cNvPr id="3" name="Content Placeholder 2"/>
+          <p:cNvSpPr>
+            <a:spLocks noGrp="1"/>
+          </p:cNvSpPr>
+          <p:nvPr>
+            <p:ph idx="1"/>
+          </p:nvPr>
+        </p:nvSpPr>
+        <p:spPr/>
+        <p:txBody>
+          <a:bodyPr/>
+          <a:lstStyle/>
+          <a:p>
+            <a:pPr marL="457200" indent="-457200">
+              <a:buFont typeface="+mj-lt"/>
+              <a:buAutoNum type="arabicPeriod"/>
+            </a:pPr>
+            <a:r>
+              <a:rPr lang="en-US" dirty="0"/>
+              <a:t>Identifying Hot Tags for each Category.</a:t>
+            </a:r>
+          </a:p>
+        </p:txBody>
+      </p:sp>
+      <p:pic>
+        <p:nvPicPr>
+          <p:cNvPr id="4" name="Picture 3"/>
+          <p:cNvPicPr>
+            <a:picLocks noChangeAspect="1"/>
+          </p:cNvPicPr>
+          <p:nvPr/>
+        </p:nvPicPr>
+        <p:blipFill>
+          <a:blip r:embed="rId2">
+            <a:extLst>
+              <a:ext uri="{28A0092B-C50C-407E-A947-70E740481C1C}">
+                <a14:useLocalDpi xmlns:a14="http://schemas.microsoft.com/office/drawing/2010/main" val="0"/>
+              </a:ext>
+            </a:extLst>
+          </a:blip>
+          <a:stretch>
+            <a:fillRect/>
+          </a:stretch>
+        </p:blipFill>
+        <p:spPr>
+          <a:xfrm>
+            <a:off x="457202" y="273393"/>
+            <a:ext cx="11251758" cy="6329113"/>
+          </a:xfrm>
+          <a:prstGeom prst="rect">
+            <a:avLst/>
+          </a:prstGeom>
+        </p:spPr>
+      </p:pic>
+    </p:spTree>
+    <p:extLst>
+      <p:ext uri="{BB962C8B-B14F-4D97-AF65-F5344CB8AC3E}">
+        <p14:creationId xmlns:p14="http://schemas.microsoft.com/office/powerpoint/2010/main" val="4134526582"/>
+      </p:ext>
+    </p:extLst>
+  </p:cSld>
+  <p:clrMapOvr>
+    <a:masterClrMapping/>
+  </p:clrMapOvr>
+</p:sld>
+</file>
+
+<file path=ppt/slides/slide19.xml><?xml version="1.0" encoding="utf-8"?>
+<p:sld xmlns:a="http://schemas.openxmlformats.org/drawingml/2006/main" xmlns:r="http://schemas.openxmlformats.org/officeDocument/2006/relationships" xmlns:p="http://schemas.openxmlformats.org/presentationml/2006/main">
+  <p:cSld>
+    <p:spTree>
+      <p:nvGrpSpPr>
+        <p:cNvPr id="1" name=""/>
+        <p:cNvGrpSpPr/>
+        <p:nvPr/>
+      </p:nvGrpSpPr>
+      <p:grpSpPr>
+        <a:xfrm>
+          <a:off x="0" y="0"/>
+          <a:ext cx="0" cy="0"/>
+          <a:chOff x="0" y="0"/>
+          <a:chExt cx="0" cy="0"/>
+        </a:xfrm>
+      </p:grpSpPr>
+      <p:sp>
+        <p:nvSpPr>
+          <p:cNvPr id="2" name="Title 1"/>
+          <p:cNvSpPr>
+            <a:spLocks noGrp="1"/>
+          </p:cNvSpPr>
+          <p:nvPr>
+            <p:ph type="title"/>
+          </p:nvPr>
+        </p:nvSpPr>
+        <p:spPr/>
+        <p:txBody>
+          <a:bodyPr/>
+          <a:lstStyle/>
+          <a:p>
+            <a:r>
+              <a:rPr lang="en-US" dirty="0"/>
+              <a:t>Visualization 5</a:t>
+            </a:r>
+          </a:p>
+        </p:txBody>
+      </p:sp>
+      <p:sp>
+        <p:nvSpPr>
+          <p:cNvPr id="3" name="Content Placeholder 2"/>
+          <p:cNvSpPr>
+            <a:spLocks noGrp="1"/>
+          </p:cNvSpPr>
+          <p:nvPr>
+            <p:ph idx="1"/>
+          </p:nvPr>
+        </p:nvSpPr>
+        <p:spPr/>
+        <p:txBody>
+          <a:bodyPr/>
+          <a:lstStyle/>
+          <a:p>
+            <a:pPr marL="457200" indent="-457200">
+              <a:buFont typeface="+mj-lt"/>
+              <a:buAutoNum type="arabicPeriod"/>
+            </a:pPr>
+            <a:r>
+              <a:rPr lang="en-US" dirty="0"/>
+              <a:t>Identifying Hot Tags for each Category.</a:t>
+            </a:r>
+          </a:p>
+        </p:txBody>
+      </p:sp>
+      <p:pic>
+        <p:nvPicPr>
+          <p:cNvPr id="4" name="Picture 3"/>
+          <p:cNvPicPr>
+            <a:picLocks noChangeAspect="1"/>
+          </p:cNvPicPr>
+          <p:nvPr/>
+        </p:nvPicPr>
+        <p:blipFill>
+          <a:blip r:embed="rId2">
+            <a:extLst>
+              <a:ext uri="{28A0092B-C50C-407E-A947-70E740481C1C}">
+                <a14:useLocalDpi xmlns:a14="http://schemas.microsoft.com/office/drawing/2010/main" val="0"/>
+              </a:ext>
+            </a:extLst>
+          </a:blip>
+          <a:stretch>
+            <a:fillRect/>
+          </a:stretch>
+        </p:blipFill>
+        <p:spPr>
+          <a:xfrm>
+            <a:off x="396687" y="217674"/>
+            <a:ext cx="11398624" cy="6411726"/>
+          </a:xfrm>
+          <a:prstGeom prst="rect">
+            <a:avLst/>
+          </a:prstGeom>
+        </p:spPr>
+      </p:pic>
+    </p:spTree>
+    <p:extLst>
+      <p:ext uri="{BB962C8B-B14F-4D97-AF65-F5344CB8AC3E}">
+        <p14:creationId xmlns:p14="http://schemas.microsoft.com/office/powerpoint/2010/main" val="3625311601"/>
+      </p:ext>
+    </p:extLst>
+  </p:cSld>
+  <p:clrMapOvr>
+    <a:masterClrMapping/>
+  </p:clrMapOvr>
 </p:sld>
 </file>
 
@@ -6216,10 +6981,9 @@
           <a:lstStyle/>
           <a:p>
             <a:r>
-              <a:rPr lang="en-US" dirty="0" smtClean="0"/>
+              <a:rPr lang="en-US" dirty="0"/>
               <a:t>Problem Statement</a:t>
             </a:r>
-            <a:endParaRPr lang="en-US" dirty="0"/>
           </a:p>
         </p:txBody>
       </p:sp>
@@ -6245,7 +7009,7 @@
               <a:buAutoNum type="arabicPeriod"/>
             </a:pPr>
             <a:r>
-              <a:rPr lang="en-US" dirty="0" smtClean="0"/>
+              <a:rPr lang="en-US" dirty="0"/>
               <a:t>To find the top trending videos in each category.</a:t>
             </a:r>
           </a:p>
@@ -6255,7 +7019,7 @@
               <a:buAutoNum type="arabicPeriod"/>
             </a:pPr>
             <a:r>
-              <a:rPr lang="en-US" dirty="0" smtClean="0"/>
+              <a:rPr lang="en-US" dirty="0"/>
               <a:t>To find the trending category based on views of videos.</a:t>
             </a:r>
           </a:p>
@@ -6265,7 +7029,7 @@
               <a:buAutoNum type="arabicPeriod"/>
             </a:pPr>
             <a:r>
-              <a:rPr lang="en-US" dirty="0" smtClean="0"/>
+              <a:rPr lang="en-US" dirty="0"/>
               <a:t>Analysis of categories.</a:t>
             </a:r>
           </a:p>
@@ -6275,12 +7039,8 @@
               <a:buAutoNum type="arabicPeriod"/>
             </a:pPr>
             <a:r>
-              <a:rPr lang="en-US" dirty="0" smtClean="0"/>
-              <a:t>Average number of Views and average number of Likes for each category</a:t>
-            </a:r>
-            <a:r>
-              <a:rPr lang="en-US" dirty="0" smtClean="0"/>
-              <a:t>.</a:t>
+              <a:rPr lang="en-US" dirty="0"/>
+              <a:t>Average number of Views and average number of Likes for each category.</a:t>
             </a:r>
           </a:p>
           <a:p>
@@ -6289,7 +7049,7 @@
               <a:buAutoNum type="arabicPeriod"/>
             </a:pPr>
             <a:r>
-              <a:rPr lang="en-US" dirty="0" smtClean="0"/>
+              <a:rPr lang="en-US" dirty="0"/>
               <a:t>Identifying Hot Tags for each Category.</a:t>
             </a:r>
           </a:p>
@@ -6299,10 +7059,9 @@
               <a:buAutoNum type="arabicPeriod"/>
             </a:pPr>
             <a:r>
-              <a:rPr lang="en-US" dirty="0" smtClean="0"/>
+              <a:rPr lang="en-US" dirty="0"/>
               <a:t>Predicting if the new obtained video can feature in the trending video list.</a:t>
             </a:r>
-            <a:endParaRPr lang="en-US" dirty="0" smtClean="0"/>
           </a:p>
         </p:txBody>
       </p:sp>
@@ -6316,13 +7075,514 @@
   <p:clrMapOvr>
     <a:masterClrMapping/>
   </p:clrMapOvr>
-  <p:timing>
-    <p:tnLst>
-      <p:par>
-        <p:cTn id="1" dur="indefinite" restart="never" nodeType="tmRoot"/>
-      </p:par>
-    </p:tnLst>
-  </p:timing>
+</p:sld>
+</file>
+
+<file path=ppt/slides/slide20.xml><?xml version="1.0" encoding="utf-8"?>
+<p:sld xmlns:a="http://schemas.openxmlformats.org/drawingml/2006/main" xmlns:r="http://schemas.openxmlformats.org/officeDocument/2006/relationships" xmlns:p="http://schemas.openxmlformats.org/presentationml/2006/main">
+  <p:cSld>
+    <p:spTree>
+      <p:nvGrpSpPr>
+        <p:cNvPr id="1" name=""/>
+        <p:cNvGrpSpPr/>
+        <p:nvPr/>
+      </p:nvGrpSpPr>
+      <p:grpSpPr>
+        <a:xfrm>
+          <a:off x="0" y="0"/>
+          <a:ext cx="0" cy="0"/>
+          <a:chOff x="0" y="0"/>
+          <a:chExt cx="0" cy="0"/>
+        </a:xfrm>
+      </p:grpSpPr>
+      <p:sp>
+        <p:nvSpPr>
+          <p:cNvPr id="2" name="Title 1"/>
+          <p:cNvSpPr>
+            <a:spLocks noGrp="1"/>
+          </p:cNvSpPr>
+          <p:nvPr>
+            <p:ph type="title"/>
+          </p:nvPr>
+        </p:nvSpPr>
+        <p:spPr/>
+        <p:txBody>
+          <a:bodyPr/>
+          <a:lstStyle/>
+          <a:p>
+            <a:r>
+              <a:rPr lang="en-US" dirty="0"/>
+              <a:t>Visualization 5</a:t>
+            </a:r>
+          </a:p>
+        </p:txBody>
+      </p:sp>
+      <p:sp>
+        <p:nvSpPr>
+          <p:cNvPr id="3" name="Content Placeholder 2"/>
+          <p:cNvSpPr>
+            <a:spLocks noGrp="1"/>
+          </p:cNvSpPr>
+          <p:nvPr>
+            <p:ph idx="1"/>
+          </p:nvPr>
+        </p:nvSpPr>
+        <p:spPr/>
+        <p:txBody>
+          <a:bodyPr/>
+          <a:lstStyle/>
+          <a:p>
+            <a:pPr marL="457200" indent="-457200">
+              <a:buFont typeface="+mj-lt"/>
+              <a:buAutoNum type="arabicPeriod"/>
+            </a:pPr>
+            <a:r>
+              <a:rPr lang="en-US" dirty="0"/>
+              <a:t>Identifying Hot Tags for each Category.</a:t>
+            </a:r>
+          </a:p>
+        </p:txBody>
+      </p:sp>
+      <p:pic>
+        <p:nvPicPr>
+          <p:cNvPr id="4" name="Picture 3"/>
+          <p:cNvPicPr>
+            <a:picLocks noChangeAspect="1"/>
+          </p:cNvPicPr>
+          <p:nvPr/>
+        </p:nvPicPr>
+        <p:blipFill>
+          <a:blip r:embed="rId2">
+            <a:extLst>
+              <a:ext uri="{28A0092B-C50C-407E-A947-70E740481C1C}">
+                <a14:useLocalDpi xmlns:a14="http://schemas.microsoft.com/office/drawing/2010/main" val="0"/>
+              </a:ext>
+            </a:extLst>
+          </a:blip>
+          <a:stretch>
+            <a:fillRect/>
+          </a:stretch>
+        </p:blipFill>
+        <p:spPr>
+          <a:xfrm>
+            <a:off x="416860" y="226919"/>
+            <a:ext cx="11358282" cy="6389034"/>
+          </a:xfrm>
+          <a:prstGeom prst="rect">
+            <a:avLst/>
+          </a:prstGeom>
+        </p:spPr>
+      </p:pic>
+    </p:spTree>
+    <p:extLst>
+      <p:ext uri="{BB962C8B-B14F-4D97-AF65-F5344CB8AC3E}">
+        <p14:creationId xmlns:p14="http://schemas.microsoft.com/office/powerpoint/2010/main" val="1733202859"/>
+      </p:ext>
+    </p:extLst>
+  </p:cSld>
+  <p:clrMapOvr>
+    <a:masterClrMapping/>
+  </p:clrMapOvr>
+</p:sld>
+</file>
+
+<file path=ppt/slides/slide21.xml><?xml version="1.0" encoding="utf-8"?>
+<p:sld xmlns:a="http://schemas.openxmlformats.org/drawingml/2006/main" xmlns:r="http://schemas.openxmlformats.org/officeDocument/2006/relationships" xmlns:p="http://schemas.openxmlformats.org/presentationml/2006/main">
+  <p:cSld>
+    <p:spTree>
+      <p:nvGrpSpPr>
+        <p:cNvPr id="1" name=""/>
+        <p:cNvGrpSpPr/>
+        <p:nvPr/>
+      </p:nvGrpSpPr>
+      <p:grpSpPr>
+        <a:xfrm>
+          <a:off x="0" y="0"/>
+          <a:ext cx="0" cy="0"/>
+          <a:chOff x="0" y="0"/>
+          <a:chExt cx="0" cy="0"/>
+        </a:xfrm>
+      </p:grpSpPr>
+      <p:sp>
+        <p:nvSpPr>
+          <p:cNvPr id="2" name="Title 1">
+            <a:extLst>
+              <a:ext uri="{FF2B5EF4-FFF2-40B4-BE49-F238E27FC236}">
+                <a16:creationId xmlns:a16="http://schemas.microsoft.com/office/drawing/2014/main" id="{CBB50D2F-0AE3-4447-B6B4-22B8E9C8F683}"/>
+              </a:ext>
+            </a:extLst>
+          </p:cNvPr>
+          <p:cNvSpPr>
+            <a:spLocks noGrp="1"/>
+          </p:cNvSpPr>
+          <p:nvPr>
+            <p:ph type="title"/>
+          </p:nvPr>
+        </p:nvSpPr>
+        <p:spPr/>
+        <p:txBody>
+          <a:bodyPr>
+            <a:normAutofit/>
+          </a:bodyPr>
+          <a:lstStyle/>
+          <a:p>
+            <a:r>
+              <a:rPr lang="en-IN" dirty="0"/>
+              <a:t>Prediction</a:t>
+            </a:r>
+            <a:endParaRPr lang="en-US" dirty="0"/>
+          </a:p>
+        </p:txBody>
+      </p:sp>
+      <p:sp>
+        <p:nvSpPr>
+          <p:cNvPr id="3" name="Content Placeholder 2">
+            <a:extLst>
+              <a:ext uri="{FF2B5EF4-FFF2-40B4-BE49-F238E27FC236}">
+                <a16:creationId xmlns:a16="http://schemas.microsoft.com/office/drawing/2014/main" id="{FA2D2280-AF38-4D33-9ABA-34C1C70C76E6}"/>
+              </a:ext>
+            </a:extLst>
+          </p:cNvPr>
+          <p:cNvSpPr>
+            <a:spLocks noGrp="1"/>
+          </p:cNvSpPr>
+          <p:nvPr>
+            <p:ph idx="1"/>
+          </p:nvPr>
+        </p:nvSpPr>
+        <p:spPr>
+          <a:xfrm>
+            <a:off x="1295401" y="2556932"/>
+            <a:ext cx="9601196" cy="2015070"/>
+          </a:xfrm>
+        </p:spPr>
+        <p:txBody>
+          <a:bodyPr>
+            <a:normAutofit/>
+          </a:bodyPr>
+          <a:lstStyle/>
+          <a:p>
+            <a:pPr marL="0" indent="0" algn="ctr">
+              <a:buNone/>
+            </a:pPr>
+            <a:r>
+              <a:rPr lang="en-IN" sz="2800" dirty="0"/>
+              <a:t>Predicting whether or not a newly obtained video will feature in any of the categories of our trending videos</a:t>
+            </a:r>
+            <a:endParaRPr lang="en-US" sz="2800" dirty="0"/>
+          </a:p>
+        </p:txBody>
+      </p:sp>
+    </p:spTree>
+    <p:extLst>
+      <p:ext uri="{BB962C8B-B14F-4D97-AF65-F5344CB8AC3E}">
+        <p14:creationId xmlns:p14="http://schemas.microsoft.com/office/powerpoint/2010/main" val="1269723440"/>
+      </p:ext>
+    </p:extLst>
+  </p:cSld>
+  <p:clrMapOvr>
+    <a:masterClrMapping/>
+  </p:clrMapOvr>
+</p:sld>
+</file>
+
+<file path=ppt/slides/slide22.xml><?xml version="1.0" encoding="utf-8"?>
+<p:sld xmlns:a="http://schemas.openxmlformats.org/drawingml/2006/main" xmlns:r="http://schemas.openxmlformats.org/officeDocument/2006/relationships" xmlns:p="http://schemas.openxmlformats.org/presentationml/2006/main">
+  <p:cSld>
+    <p:spTree>
+      <p:nvGrpSpPr>
+        <p:cNvPr id="1" name=""/>
+        <p:cNvGrpSpPr/>
+        <p:nvPr/>
+      </p:nvGrpSpPr>
+      <p:grpSpPr>
+        <a:xfrm>
+          <a:off x="0" y="0"/>
+          <a:ext cx="0" cy="0"/>
+          <a:chOff x="0" y="0"/>
+          <a:chExt cx="0" cy="0"/>
+        </a:xfrm>
+      </p:grpSpPr>
+      <p:sp>
+        <p:nvSpPr>
+          <p:cNvPr id="2" name="Title 1">
+            <a:extLst>
+              <a:ext uri="{FF2B5EF4-FFF2-40B4-BE49-F238E27FC236}">
+                <a16:creationId xmlns:a16="http://schemas.microsoft.com/office/drawing/2014/main" id="{0478F7F3-6522-4E85-9CAC-433167F75C63}"/>
+              </a:ext>
+            </a:extLst>
+          </p:cNvPr>
+          <p:cNvSpPr>
+            <a:spLocks noGrp="1"/>
+          </p:cNvSpPr>
+          <p:nvPr>
+            <p:ph type="title"/>
+          </p:nvPr>
+        </p:nvSpPr>
+        <p:spPr/>
+        <p:txBody>
+          <a:bodyPr/>
+          <a:lstStyle/>
+          <a:p>
+            <a:r>
+              <a:rPr lang="en-IN" dirty="0"/>
+              <a:t>Process</a:t>
+            </a:r>
+            <a:endParaRPr lang="en-US" dirty="0"/>
+          </a:p>
+        </p:txBody>
+      </p:sp>
+      <p:sp>
+        <p:nvSpPr>
+          <p:cNvPr id="3" name="Content Placeholder 2">
+            <a:extLst>
+              <a:ext uri="{FF2B5EF4-FFF2-40B4-BE49-F238E27FC236}">
+                <a16:creationId xmlns:a16="http://schemas.microsoft.com/office/drawing/2014/main" id="{A191AED5-780A-49E2-8C91-C7587229C1F9}"/>
+              </a:ext>
+            </a:extLst>
+          </p:cNvPr>
+          <p:cNvSpPr>
+            <a:spLocks noGrp="1"/>
+          </p:cNvSpPr>
+          <p:nvPr>
+            <p:ph idx="1"/>
+          </p:nvPr>
+        </p:nvSpPr>
+        <p:spPr/>
+        <p:txBody>
+          <a:bodyPr/>
+          <a:lstStyle/>
+          <a:p>
+            <a:r>
+              <a:rPr lang="en-IN" dirty="0"/>
+              <a:t>Reading</a:t>
+            </a:r>
+          </a:p>
+          <a:p>
+            <a:r>
+              <a:rPr lang="en-IN" dirty="0"/>
+              <a:t>Cleaning</a:t>
+            </a:r>
+          </a:p>
+          <a:p>
+            <a:r>
+              <a:rPr lang="en-IN" dirty="0"/>
+              <a:t>Merging</a:t>
+            </a:r>
+          </a:p>
+          <a:p>
+            <a:r>
+              <a:rPr lang="en-IN" dirty="0"/>
+              <a:t>Pre-processing</a:t>
+            </a:r>
+          </a:p>
+          <a:p>
+            <a:r>
+              <a:rPr lang="en-IN" dirty="0" err="1"/>
+              <a:t>Modeling</a:t>
+            </a:r>
+            <a:endParaRPr lang="en-IN" dirty="0"/>
+          </a:p>
+          <a:p>
+            <a:r>
+              <a:rPr lang="en-IN" dirty="0"/>
+              <a:t>Performance</a:t>
+            </a:r>
+            <a:endParaRPr lang="en-US" dirty="0"/>
+          </a:p>
+        </p:txBody>
+      </p:sp>
+    </p:spTree>
+    <p:extLst>
+      <p:ext uri="{BB962C8B-B14F-4D97-AF65-F5344CB8AC3E}">
+        <p14:creationId xmlns:p14="http://schemas.microsoft.com/office/powerpoint/2010/main" val="2540341653"/>
+      </p:ext>
+    </p:extLst>
+  </p:cSld>
+  <p:clrMapOvr>
+    <a:masterClrMapping/>
+  </p:clrMapOvr>
+</p:sld>
+</file>
+
+<file path=ppt/slides/slide23.xml><?xml version="1.0" encoding="utf-8"?>
+<p:sld xmlns:a="http://schemas.openxmlformats.org/drawingml/2006/main" xmlns:r="http://schemas.openxmlformats.org/officeDocument/2006/relationships" xmlns:p="http://schemas.openxmlformats.org/presentationml/2006/main">
+  <p:cSld>
+    <p:spTree>
+      <p:nvGrpSpPr>
+        <p:cNvPr id="1" name=""/>
+        <p:cNvGrpSpPr/>
+        <p:nvPr/>
+      </p:nvGrpSpPr>
+      <p:grpSpPr>
+        <a:xfrm>
+          <a:off x="0" y="0"/>
+          <a:ext cx="0" cy="0"/>
+          <a:chOff x="0" y="0"/>
+          <a:chExt cx="0" cy="0"/>
+        </a:xfrm>
+      </p:grpSpPr>
+      <p:pic>
+        <p:nvPicPr>
+          <p:cNvPr id="5" name="Picture 4">
+            <a:extLst>
+              <a:ext uri="{FF2B5EF4-FFF2-40B4-BE49-F238E27FC236}">
+                <a16:creationId xmlns:a16="http://schemas.microsoft.com/office/drawing/2014/main" id="{697A1CFF-DEE7-4A74-A736-D32D31D27A38}"/>
+              </a:ext>
+            </a:extLst>
+          </p:cNvPr>
+          <p:cNvPicPr>
+            <a:picLocks noChangeAspect="1"/>
+          </p:cNvPicPr>
+          <p:nvPr/>
+        </p:nvPicPr>
+        <p:blipFill>
+          <a:blip r:embed="rId2" cstate="print">
+            <a:extLst>
+              <a:ext uri="{28A0092B-C50C-407E-A947-70E740481C1C}">
+                <a14:useLocalDpi xmlns:a14="http://schemas.microsoft.com/office/drawing/2010/main" val="0"/>
+              </a:ext>
+            </a:extLst>
+          </a:blip>
+          <a:stretch>
+            <a:fillRect/>
+          </a:stretch>
+        </p:blipFill>
+        <p:spPr>
+          <a:xfrm>
+            <a:off x="631595" y="665455"/>
+            <a:ext cx="5513895" cy="5527090"/>
+          </a:xfrm>
+          <a:prstGeom prst="rect">
+            <a:avLst/>
+          </a:prstGeom>
+        </p:spPr>
+      </p:pic>
+      <p:pic>
+        <p:nvPicPr>
+          <p:cNvPr id="6" name="Picture 5">
+            <a:extLst>
+              <a:ext uri="{FF2B5EF4-FFF2-40B4-BE49-F238E27FC236}">
+                <a16:creationId xmlns:a16="http://schemas.microsoft.com/office/drawing/2014/main" id="{050DC5B5-7B27-4D0A-BB68-39B9E1795E0E}"/>
+              </a:ext>
+            </a:extLst>
+          </p:cNvPr>
+          <p:cNvPicPr/>
+          <p:nvPr/>
+        </p:nvPicPr>
+        <p:blipFill>
+          <a:blip r:embed="rId3"/>
+          <a:stretch>
+            <a:fillRect/>
+          </a:stretch>
+        </p:blipFill>
+        <p:spPr>
+          <a:xfrm>
+            <a:off x="6145490" y="783354"/>
+            <a:ext cx="5433060" cy="1313180"/>
+          </a:xfrm>
+          <a:prstGeom prst="rect">
+            <a:avLst/>
+          </a:prstGeom>
+        </p:spPr>
+      </p:pic>
+      <p:pic>
+        <p:nvPicPr>
+          <p:cNvPr id="7" name="Picture 6">
+            <a:extLst>
+              <a:ext uri="{FF2B5EF4-FFF2-40B4-BE49-F238E27FC236}">
+                <a16:creationId xmlns:a16="http://schemas.microsoft.com/office/drawing/2014/main" id="{B1E6EC2F-D33E-472A-8C76-63E5C32AF632}"/>
+              </a:ext>
+            </a:extLst>
+          </p:cNvPr>
+          <p:cNvPicPr/>
+          <p:nvPr/>
+        </p:nvPicPr>
+        <p:blipFill>
+          <a:blip r:embed="rId4"/>
+          <a:stretch>
+            <a:fillRect/>
+          </a:stretch>
+        </p:blipFill>
+        <p:spPr>
+          <a:xfrm>
+            <a:off x="6179271" y="2621924"/>
+            <a:ext cx="5381134" cy="1191218"/>
+          </a:xfrm>
+          <a:prstGeom prst="rect">
+            <a:avLst/>
+          </a:prstGeom>
+        </p:spPr>
+      </p:pic>
+    </p:spTree>
+    <p:extLst>
+      <p:ext uri="{BB962C8B-B14F-4D97-AF65-F5344CB8AC3E}">
+        <p14:creationId xmlns:p14="http://schemas.microsoft.com/office/powerpoint/2010/main" val="66340566"/>
+      </p:ext>
+    </p:extLst>
+  </p:cSld>
+  <p:clrMapOvr>
+    <a:masterClrMapping/>
+  </p:clrMapOvr>
+</p:sld>
+</file>
+
+<file path=ppt/slides/slide24.xml><?xml version="1.0" encoding="utf-8"?>
+<p:sld xmlns:a="http://schemas.openxmlformats.org/drawingml/2006/main" xmlns:r="http://schemas.openxmlformats.org/officeDocument/2006/relationships" xmlns:p="http://schemas.openxmlformats.org/presentationml/2006/main">
+  <p:cSld>
+    <p:spTree>
+      <p:nvGrpSpPr>
+        <p:cNvPr id="1" name=""/>
+        <p:cNvGrpSpPr/>
+        <p:nvPr/>
+      </p:nvGrpSpPr>
+      <p:grpSpPr>
+        <a:xfrm>
+          <a:off x="0" y="0"/>
+          <a:ext cx="0" cy="0"/>
+          <a:chOff x="0" y="0"/>
+          <a:chExt cx="0" cy="0"/>
+        </a:xfrm>
+      </p:grpSpPr>
+      <p:sp>
+        <p:nvSpPr>
+          <p:cNvPr id="2" name="Title 1">
+            <a:extLst>
+              <a:ext uri="{FF2B5EF4-FFF2-40B4-BE49-F238E27FC236}">
+                <a16:creationId xmlns:a16="http://schemas.microsoft.com/office/drawing/2014/main" id="{90466CE6-5CB1-46EE-AB5D-2D0E81AC8B91}"/>
+              </a:ext>
+            </a:extLst>
+          </p:cNvPr>
+          <p:cNvSpPr>
+            <a:spLocks noGrp="1"/>
+          </p:cNvSpPr>
+          <p:nvPr>
+            <p:ph type="title"/>
+          </p:nvPr>
+        </p:nvSpPr>
+        <p:spPr/>
+        <p:txBody>
+          <a:bodyPr/>
+          <a:lstStyle/>
+          <a:p>
+            <a:r>
+              <a:rPr lang="en-IN" dirty="0"/>
+              <a:t>Thank You</a:t>
+            </a:r>
+            <a:endParaRPr lang="en-US" dirty="0"/>
+          </a:p>
+        </p:txBody>
+      </p:sp>
+    </p:spTree>
+    <p:extLst>
+      <p:ext uri="{BB962C8B-B14F-4D97-AF65-F5344CB8AC3E}">
+        <p14:creationId xmlns:p14="http://schemas.microsoft.com/office/powerpoint/2010/main" val="552097652"/>
+      </p:ext>
+    </p:extLst>
+  </p:cSld>
+  <p:clrMapOvr>
+    <a:masterClrMapping/>
+  </p:clrMapOvr>
 </p:sld>
 </file>
 
@@ -6472,15 +7732,15 @@
           <a:lstStyle/>
           <a:p>
             <a:r>
-              <a:rPr lang="en-US" sz="1400" dirty="0" err="1" smtClean="0"/>
+              <a:rPr lang="en-US" sz="1400" dirty="0" err="1"/>
               <a:t>Youtube</a:t>
             </a:r>
             <a:r>
-              <a:rPr lang="en-US" sz="1400" dirty="0" smtClean="0"/>
+              <a:rPr lang="en-US" sz="1400" dirty="0"/>
               <a:t> Data </a:t>
             </a:r>
             <a:r>
-              <a:rPr lang="en-US" sz="1400" dirty="0" err="1" smtClean="0"/>
+              <a:rPr lang="en-US" sz="1400" dirty="0" err="1"/>
               <a:t>Centres</a:t>
             </a:r>
             <a:endParaRPr lang="en-US" sz="1400" dirty="0"/>
@@ -6593,14 +7853,13 @@
           <a:lstStyle/>
           <a:p>
             <a:r>
-              <a:rPr lang="en-US" sz="1600" dirty="0" err="1" smtClean="0"/>
+              <a:rPr lang="en-US" sz="1600" dirty="0" err="1"/>
               <a:t>Youtube</a:t>
             </a:r>
             <a:r>
-              <a:rPr lang="en-US" sz="1600" dirty="0" smtClean="0"/>
+              <a:rPr lang="en-US" sz="1600" dirty="0"/>
               <a:t> API</a:t>
             </a:r>
-            <a:endParaRPr lang="en-US" sz="1600" dirty="0"/>
           </a:p>
         </p:txBody>
       </p:sp>
@@ -6650,10 +7909,9 @@
           <a:lstStyle/>
           <a:p>
             <a:r>
-              <a:rPr lang="en-US" sz="1400" dirty="0" smtClean="0"/>
+              <a:rPr lang="en-US" sz="1400" dirty="0"/>
               <a:t>Kafka Message Queue</a:t>
             </a:r>
-            <a:endParaRPr lang="en-US" sz="1400" dirty="0"/>
           </a:p>
         </p:txBody>
       </p:sp>
@@ -6789,14 +8047,13 @@
           <a:lstStyle/>
           <a:p>
             <a:r>
-              <a:rPr lang="en-US" sz="1400" dirty="0" err="1" smtClean="0"/>
+              <a:rPr lang="en-US" sz="1400" dirty="0" err="1"/>
               <a:t>MemSQL</a:t>
             </a:r>
             <a:r>
-              <a:rPr lang="en-US" sz="1400" dirty="0" smtClean="0"/>
+              <a:rPr lang="en-US" sz="1400" dirty="0"/>
               <a:t> Data Store</a:t>
             </a:r>
-            <a:endParaRPr lang="en-US" sz="1400" dirty="0"/>
           </a:p>
         </p:txBody>
       </p:sp>
@@ -6898,10 +8155,9 @@
           <a:lstStyle/>
           <a:p>
             <a:r>
-              <a:rPr lang="en-US" sz="1400" dirty="0" smtClean="0"/>
+              <a:rPr lang="en-US" sz="1400" dirty="0"/>
               <a:t>Spark code </a:t>
             </a:r>
-            <a:endParaRPr lang="en-US" sz="1400" dirty="0"/>
           </a:p>
         </p:txBody>
       </p:sp>
@@ -6965,10 +8221,9 @@
           <a:lstStyle/>
           <a:p>
             <a:r>
-              <a:rPr lang="en-US" sz="4800" dirty="0" smtClean="0"/>
+              <a:rPr lang="en-US" sz="4800" dirty="0"/>
               <a:t>Architecture Diagram</a:t>
             </a:r>
-            <a:endParaRPr lang="en-US" sz="4800" dirty="0"/>
           </a:p>
         </p:txBody>
       </p:sp>
@@ -6982,13 +8237,6 @@
   <p:clrMapOvr>
     <a:masterClrMapping/>
   </p:clrMapOvr>
-  <p:timing>
-    <p:tnLst>
-      <p:par>
-        <p:cTn id="1" dur="indefinite" restart="never" nodeType="tmRoot"/>
-      </p:par>
-    </p:tnLst>
-  </p:timing>
 </p:sld>
 </file>
 
@@ -7152,15 +8400,15 @@
             <a:lstStyle/>
             <a:p>
               <a:r>
-                <a:rPr lang="en-US" sz="1400" dirty="0" err="1" smtClean="0"/>
+                <a:rPr lang="en-US" sz="1400" dirty="0" err="1"/>
                 <a:t>Youtube</a:t>
               </a:r>
               <a:r>
-                <a:rPr lang="en-US" sz="1400" dirty="0" smtClean="0"/>
+                <a:rPr lang="en-US" sz="1400" dirty="0"/>
                 <a:t> Data </a:t>
               </a:r>
               <a:r>
-                <a:rPr lang="en-US" sz="1400" dirty="0" err="1" smtClean="0"/>
+                <a:rPr lang="en-US" sz="1400" dirty="0" err="1"/>
                 <a:t>Centres</a:t>
               </a:r>
               <a:endParaRPr lang="en-US" sz="1400" dirty="0"/>
@@ -7273,14 +8521,13 @@
             <a:lstStyle/>
             <a:p>
               <a:r>
-                <a:rPr lang="en-US" sz="1400" dirty="0" err="1" smtClean="0"/>
+                <a:rPr lang="en-US" sz="1400" dirty="0" err="1"/>
                 <a:t>Youtube</a:t>
               </a:r>
               <a:r>
-                <a:rPr lang="en-US" sz="1400" dirty="0" smtClean="0"/>
+                <a:rPr lang="en-US" sz="1400" dirty="0"/>
                 <a:t> API</a:t>
               </a:r>
-              <a:endParaRPr lang="en-US" sz="1400" dirty="0"/>
             </a:p>
           </p:txBody>
         </p:sp>
@@ -7330,10 +8577,9 @@
             <a:lstStyle/>
             <a:p>
               <a:r>
-                <a:rPr lang="en-US" sz="1400" dirty="0" smtClean="0"/>
+                <a:rPr lang="en-US" sz="1400" dirty="0"/>
                 <a:t>Kafka Message Queue</a:t>
               </a:r>
-              <a:endParaRPr lang="en-US" sz="1400" dirty="0"/>
             </a:p>
           </p:txBody>
         </p:sp>
@@ -7396,33 +8642,25 @@
           <a:lstStyle/>
           <a:p>
             <a:r>
-              <a:rPr lang="en-US" sz="2000" dirty="0" smtClean="0"/>
+              <a:rPr lang="en-US" sz="2000" dirty="0"/>
               <a:t>Kafka Message Bus. It enables us to stream real-time data to our spark code to perform the analysis.</a:t>
             </a:r>
           </a:p>
           <a:p>
             <a:r>
-              <a:rPr lang="en-US" sz="2000" dirty="0" smtClean="0"/>
+              <a:rPr lang="en-US" sz="2000" dirty="0"/>
               <a:t>There are two topics corresponding to 2 types of data which we receive from the API requests.</a:t>
             </a:r>
           </a:p>
           <a:p>
             <a:r>
-              <a:rPr lang="en-US" sz="2000" dirty="0" smtClean="0"/>
-              <a:t>The topics currently have 1 partition only. But, we can leverage this parameter to further partition the topics based on categories and so on.</a:t>
-            </a:r>
-            <a:r>
               <a:rPr lang="en-US" sz="2000" dirty="0"/>
-              <a:t> </a:t>
-            </a:r>
-            <a:r>
-              <a:rPr lang="en-US" sz="2000" dirty="0" smtClean="0"/>
-              <a:t>This will enable us to parallelize the analysis step further.</a:t>
-            </a:r>
-          </a:p>
-          <a:p>
-            <a:r>
-              <a:rPr lang="en-US" sz="2000" dirty="0" smtClean="0"/>
+              <a:t>The topics currently have 1 partition only. But, we can leverage this parameter to further partition the topics based on categories and so on. This will enable us to parallelize the analysis step further.</a:t>
+            </a:r>
+          </a:p>
+          <a:p>
+            <a:r>
+              <a:rPr lang="en-US" sz="2000" dirty="0"/>
               <a:t>Kafka follows a Producer/Consumer Model.</a:t>
             </a:r>
           </a:p>
@@ -7455,10 +8693,9 @@
           <a:lstStyle/>
           <a:p>
             <a:r>
-              <a:rPr lang="en-US" sz="4800" dirty="0" smtClean="0"/>
+              <a:rPr lang="en-US" sz="4800" dirty="0"/>
               <a:t>Component Breakdown</a:t>
             </a:r>
-            <a:endParaRPr lang="en-US" sz="4800" dirty="0"/>
           </a:p>
         </p:txBody>
       </p:sp>
@@ -7472,13 +8709,6 @@
   <p:clrMapOvr>
     <a:masterClrMapping/>
   </p:clrMapOvr>
-  <p:timing>
-    <p:tnLst>
-      <p:par>
-        <p:cTn id="1" dur="indefinite" restart="never" nodeType="tmRoot"/>
-      </p:par>
-    </p:tnLst>
-  </p:timing>
 </p:sld>
 </file>
 
@@ -7566,37 +8796,32 @@
             </a:r>
             <a:r>
               <a:rPr lang="en-US" sz="2000" dirty="0"/>
-              <a:t> is a real-time data warehouse for cloud and on-premises that delivers immediate insights across live and historical </a:t>
-            </a:r>
-            <a:r>
-              <a:rPr lang="en-US" sz="2000" dirty="0" smtClean="0"/>
-              <a:t>data.</a:t>
-            </a:r>
-            <a:endParaRPr lang="en-US" sz="2000" dirty="0"/>
-          </a:p>
-          <a:p>
-            <a:r>
-              <a:rPr lang="en-US" sz="2000" dirty="0" err="1" smtClean="0"/>
+              <a:t> is a real-time data warehouse for cloud and on-premises that delivers immediate insights across live and historical data.</a:t>
+            </a:r>
+          </a:p>
+          <a:p>
+            <a:r>
+              <a:rPr lang="en-US" sz="2000" dirty="0" err="1"/>
               <a:t>MemSQL</a:t>
             </a:r>
             <a:r>
-              <a:rPr lang="en-US" sz="2000" dirty="0" smtClean="0"/>
+              <a:rPr lang="en-US" sz="2000" dirty="0"/>
               <a:t> is like an in-memory persistent Data Store which has two tables namely Video and Statistics which consume data from Kafka and maintain a persistent storage for the data.</a:t>
             </a:r>
           </a:p>
           <a:p>
             <a:r>
-              <a:rPr lang="en-US" sz="2000" dirty="0" smtClean="0"/>
+              <a:rPr lang="en-US" sz="2000" dirty="0"/>
               <a:t>We have used this component since in our use case we could not perform analysis on live streaming data and required a batch or a set of data to be available.</a:t>
             </a:r>
           </a:p>
           <a:p>
             <a:r>
-              <a:rPr lang="en-US" sz="2000" dirty="0" err="1" smtClean="0"/>
+              <a:rPr lang="en-US" sz="2000" dirty="0" err="1"/>
               <a:t>MemSQL</a:t>
             </a:r>
             <a:r>
-              <a:rPr lang="en-US" sz="2000" dirty="0" smtClean="0"/>
+              <a:rPr lang="en-US" sz="2000" dirty="0"/>
               <a:t> pipelines consume data from Kafka and insert it into the Tables.</a:t>
             </a:r>
           </a:p>
@@ -7629,10 +8854,9 @@
           <a:lstStyle/>
           <a:p>
             <a:r>
-              <a:rPr lang="en-US" sz="4800" dirty="0" smtClean="0"/>
+              <a:rPr lang="en-US" sz="4800" dirty="0"/>
               <a:t>Component Breakdown</a:t>
             </a:r>
-            <a:endParaRPr lang="en-US" sz="4800" dirty="0"/>
           </a:p>
         </p:txBody>
       </p:sp>
@@ -7742,10 +8966,9 @@
             <a:lstStyle/>
             <a:p>
               <a:r>
-                <a:rPr lang="en-US" sz="1400" dirty="0" smtClean="0"/>
+                <a:rPr lang="en-US" sz="1400" dirty="0"/>
                 <a:t>Kafka Message Queue</a:t>
               </a:r>
-              <a:endParaRPr lang="en-US" sz="1400" dirty="0"/>
             </a:p>
           </p:txBody>
         </p:sp>
@@ -7881,14 +9104,13 @@
             <a:lstStyle/>
             <a:p>
               <a:r>
-                <a:rPr lang="en-US" sz="1400" dirty="0" err="1" smtClean="0"/>
+                <a:rPr lang="en-US" sz="1400" dirty="0" err="1"/>
                 <a:t>MemSQL</a:t>
               </a:r>
               <a:r>
-                <a:rPr lang="en-US" sz="1400" dirty="0" smtClean="0"/>
+                <a:rPr lang="en-US" sz="1400" dirty="0"/>
                 <a:t> Data Store</a:t>
               </a:r>
-              <a:endParaRPr lang="en-US" sz="1400" dirty="0"/>
             </a:p>
           </p:txBody>
         </p:sp>
@@ -7939,13 +9161,6 @@
   <p:clrMapOvr>
     <a:masterClrMapping/>
   </p:clrMapOvr>
-  <p:timing>
-    <p:tnLst>
-      <p:par>
-        <p:cTn id="1" dur="indefinite" restart="never" nodeType="tmRoot"/>
-      </p:par>
-    </p:tnLst>
-  </p:timing>
 </p:sld>
 </file>
 
@@ -8028,55 +9243,55 @@
           <a:lstStyle/>
           <a:p>
             <a:r>
-              <a:rPr lang="en-US" sz="2000" dirty="0" smtClean="0"/>
+              <a:rPr lang="en-US" sz="2000" dirty="0"/>
               <a:t>Spark as we know, one the best technologies to work with Big Data. Even though currently we do not have such huge amount of data, but with YouTube Data we can be safe to assume that we will have to deal with Big Data in practical purposes.</a:t>
             </a:r>
           </a:p>
           <a:p>
             <a:r>
-              <a:rPr lang="en-US" sz="2000" dirty="0" smtClean="0"/>
+              <a:rPr lang="en-US" sz="2000" dirty="0"/>
               <a:t>We have leveraged the Spark SQL abilities to perform various types of analysis on the data we received out of YouTube.</a:t>
             </a:r>
           </a:p>
           <a:p>
             <a:r>
-              <a:rPr lang="en-US" sz="2000" dirty="0" smtClean="0"/>
+              <a:rPr lang="en-US" sz="2000" dirty="0"/>
               <a:t>Spark constantly queries the </a:t>
             </a:r>
             <a:r>
-              <a:rPr lang="en-US" sz="2000" dirty="0" err="1" smtClean="0"/>
+              <a:rPr lang="en-US" sz="2000" dirty="0" err="1"/>
               <a:t>MemSQL</a:t>
             </a:r>
             <a:r>
-              <a:rPr lang="en-US" sz="2000" dirty="0" smtClean="0"/>
+              <a:rPr lang="en-US" sz="2000" dirty="0"/>
               <a:t> tables to fetch data and perform analysis.</a:t>
             </a:r>
           </a:p>
           <a:p>
             <a:r>
-              <a:rPr lang="en-US" sz="2000" dirty="0" smtClean="0"/>
+              <a:rPr lang="en-US" sz="2000" dirty="0"/>
               <a:t>We can also write out results back into some result table in </a:t>
             </a:r>
             <a:r>
-              <a:rPr lang="en-US" sz="2000" dirty="0" err="1" smtClean="0"/>
+              <a:rPr lang="en-US" sz="2000" dirty="0" err="1"/>
               <a:t>MemSQL</a:t>
             </a:r>
             <a:r>
-              <a:rPr lang="en-US" sz="2000" dirty="0" smtClean="0"/>
+              <a:rPr lang="en-US" sz="2000" dirty="0"/>
               <a:t>.</a:t>
             </a:r>
           </a:p>
           <a:p>
             <a:r>
-              <a:rPr lang="en-US" sz="2000" dirty="0" smtClean="0"/>
+              <a:rPr lang="en-US" sz="2000" dirty="0"/>
               <a:t>We have used </a:t>
             </a:r>
             <a:r>
-              <a:rPr lang="en-US" sz="2000" dirty="0" err="1" smtClean="0"/>
+              <a:rPr lang="en-US" sz="2000" dirty="0" err="1"/>
               <a:t>scala</a:t>
             </a:r>
             <a:r>
-              <a:rPr lang="en-US" sz="2000" dirty="0" smtClean="0"/>
+              <a:rPr lang="en-US" sz="2000" dirty="0"/>
               <a:t> to write spark code.</a:t>
             </a:r>
           </a:p>
@@ -8109,10 +9324,9 @@
           <a:lstStyle/>
           <a:p>
             <a:r>
-              <a:rPr lang="en-US" sz="4800" dirty="0" smtClean="0"/>
+              <a:rPr lang="en-US" sz="4800" dirty="0"/>
               <a:t>Component Breakdown</a:t>
             </a:r>
-            <a:endParaRPr lang="en-US" sz="4800" dirty="0"/>
           </a:p>
         </p:txBody>
       </p:sp>
@@ -8228,10 +9442,9 @@
             <a:lstStyle/>
             <a:p>
               <a:r>
-                <a:rPr lang="en-US" sz="1400" dirty="0" smtClean="0"/>
+                <a:rPr lang="en-US" sz="1400" dirty="0"/>
                 <a:t>Spark code </a:t>
               </a:r>
-              <a:endParaRPr lang="en-US" sz="1400" dirty="0"/>
             </a:p>
           </p:txBody>
         </p:sp>
@@ -8331,14 +9544,13 @@
             <a:lstStyle/>
             <a:p>
               <a:r>
-                <a:rPr lang="en-US" sz="1400" dirty="0" err="1" smtClean="0"/>
+                <a:rPr lang="en-US" sz="1400" dirty="0" err="1"/>
                 <a:t>MemSQL</a:t>
               </a:r>
               <a:r>
-                <a:rPr lang="en-US" sz="1400" dirty="0" smtClean="0"/>
+                <a:rPr lang="en-US" sz="1400" dirty="0"/>
                 <a:t> Data Store</a:t>
               </a:r>
-              <a:endParaRPr lang="en-US" sz="1400" dirty="0"/>
             </a:p>
           </p:txBody>
         </p:sp>
@@ -8390,13 +9602,6 @@
   <p:clrMapOvr>
     <a:masterClrMapping/>
   </p:clrMapOvr>
-  <p:timing>
-    <p:tnLst>
-      <p:par>
-        <p:cTn id="1" dur="indefinite" restart="never" nodeType="tmRoot"/>
-      </p:par>
-    </p:tnLst>
-  </p:timing>
 </p:sld>
 </file>
 
@@ -8479,35 +9684,35 @@
           <a:lstStyle/>
           <a:p>
             <a:r>
-              <a:rPr lang="en-US" sz="2000" dirty="0" smtClean="0"/>
+              <a:rPr lang="en-US" sz="2000" dirty="0"/>
               <a:t>The complete technology stack that we have implemented in our project is highly and easily scalable to accommodate themselves into machines which have Big Data processing capabilities.</a:t>
             </a:r>
           </a:p>
           <a:p>
             <a:r>
-              <a:rPr lang="en-US" sz="2000" dirty="0" smtClean="0"/>
+              <a:rPr lang="en-US" sz="2000" dirty="0"/>
               <a:t>For </a:t>
             </a:r>
             <a:r>
-              <a:rPr lang="en-US" sz="2000" dirty="0" err="1" smtClean="0"/>
+              <a:rPr lang="en-US" sz="2000" dirty="0" err="1"/>
               <a:t>eg</a:t>
             </a:r>
             <a:r>
-              <a:rPr lang="en-US" sz="2000" dirty="0" smtClean="0"/>
+              <a:rPr lang="en-US" sz="2000" dirty="0"/>
               <a:t>: Kafka and </a:t>
             </a:r>
             <a:r>
-              <a:rPr lang="en-US" sz="2000" dirty="0" err="1" smtClean="0"/>
+              <a:rPr lang="en-US" sz="2000" dirty="0" err="1"/>
               <a:t>MemSQL</a:t>
             </a:r>
             <a:r>
-              <a:rPr lang="en-US" sz="2000" dirty="0" smtClean="0"/>
+              <a:rPr lang="en-US" sz="2000" dirty="0"/>
               <a:t> can be easily installed and used on the AWS EC2 instances.</a:t>
             </a:r>
           </a:p>
           <a:p>
             <a:r>
-              <a:rPr lang="en-US" sz="2000" dirty="0" smtClean="0"/>
+              <a:rPr lang="en-US" sz="2000" dirty="0"/>
               <a:t>Also spark can be used very efficiently on the AWS EMR Cluster.</a:t>
             </a:r>
           </a:p>
@@ -8540,10 +9745,9 @@
           <a:lstStyle/>
           <a:p>
             <a:r>
-              <a:rPr lang="en-US" sz="4800" dirty="0" smtClean="0"/>
+              <a:rPr lang="en-US" sz="4800" dirty="0"/>
               <a:t>Architecture Scalability</a:t>
             </a:r>
-            <a:endParaRPr lang="en-US" sz="4800" dirty="0"/>
           </a:p>
         </p:txBody>
       </p:sp>
@@ -8557,13 +9761,6 @@
   <p:clrMapOvr>
     <a:masterClrMapping/>
   </p:clrMapOvr>
-  <p:timing>
-    <p:tnLst>
-      <p:par>
-        <p:cTn id="1" dur="indefinite" restart="never" nodeType="tmRoot"/>
-      </p:par>
-    </p:tnLst>
-  </p:timing>
 </p:sld>
 </file>
 
@@ -8600,10 +9797,9 @@
           <a:lstStyle/>
           <a:p>
             <a:r>
-              <a:rPr lang="en-US" dirty="0" smtClean="0"/>
+              <a:rPr lang="en-US" dirty="0"/>
               <a:t>Visualization 1</a:t>
             </a:r>
-            <a:endParaRPr lang="en-US" dirty="0"/>
           </a:p>
         </p:txBody>
       </p:sp>
@@ -8623,20 +9819,15 @@
           <a:lstStyle/>
           <a:p>
             <a:r>
-              <a:rPr lang="en-US" dirty="0" smtClean="0"/>
+              <a:rPr lang="en-US" dirty="0"/>
               <a:t>Top trending videos of each categories (based on View Count)</a:t>
             </a:r>
           </a:p>
           <a:p>
             <a:r>
               <a:rPr lang="en-US" dirty="0"/>
-              <a:t>Top trending videos of each </a:t>
-            </a:r>
-            <a:r>
-              <a:rPr lang="en-US" dirty="0" smtClean="0"/>
-              <a:t>categories (based on Like Count)</a:t>
-            </a:r>
-            <a:endParaRPr lang="en-US" dirty="0"/>
+              <a:t>Top trending videos of each categories (based on Like Count)</a:t>
+            </a:r>
           </a:p>
           <a:p>
             <a:endParaRPr lang="en-US" dirty="0"/>
@@ -8653,13 +9844,6 @@
   <p:clrMapOvr>
     <a:masterClrMapping/>
   </p:clrMapOvr>
-  <p:timing>
-    <p:tnLst>
-      <p:par>
-        <p:cTn id="1" dur="indefinite" restart="never" nodeType="tmRoot"/>
-      </p:par>
-    </p:tnLst>
-  </p:timing>
 </p:sld>
 </file>
 
@@ -8701,16 +9885,15 @@
           <a:lstStyle/>
           <a:p>
             <a:r>
-              <a:rPr lang="en-US" dirty="0" smtClean="0"/>
+              <a:rPr lang="en-US" dirty="0"/>
               <a:t>Visualization 1</a:t>
             </a:r>
-            <a:endParaRPr lang="en-US" dirty="0"/>
           </a:p>
         </p:txBody>
       </p:sp>
       <p:pic>
         <p:nvPicPr>
-          <p:cNvPr id="4" name="Picture 3"/>
+          <p:cNvPr id="3" name="Picture 2"/>
           <p:cNvPicPr>
             <a:picLocks noChangeAspect="1"/>
           </p:cNvPicPr>
@@ -8730,8 +9913,8 @@
         </p:blipFill>
         <p:spPr>
           <a:xfrm>
-            <a:off x="339539" y="168508"/>
-            <a:ext cx="11486028" cy="6460892"/>
+            <a:off x="367552" y="186576"/>
+            <a:ext cx="11430001" cy="6429376"/>
           </a:xfrm>
           <a:prstGeom prst="rect">
             <a:avLst/>
@@ -8748,13 +9931,6 @@
   <p:clrMapOvr>
     <a:masterClrMapping/>
   </p:clrMapOvr>
-  <p:timing>
-    <p:tnLst>
-      <p:par>
-        <p:cTn id="1" dur="indefinite" restart="never" nodeType="tmRoot"/>
-      </p:par>
-    </p:tnLst>
-  </p:timing>
 </p:sld>
 </file>
 

</xml_diff>

<commit_message>
Modified the Ml model considering high number of samples
</commit_message>
<xml_diff>
--- a/PBDA_Project.pptx
+++ b/PBDA_Project.pptx
@@ -7450,8 +7450,8 @@
         </p:blipFill>
         <p:spPr>
           <a:xfrm>
-            <a:off x="631595" y="665455"/>
-            <a:ext cx="5513895" cy="5527090"/>
+            <a:off x="678730" y="665455"/>
+            <a:ext cx="4374053" cy="5527090"/>
           </a:xfrm>
           <a:prstGeom prst="rect">
             <a:avLst/>
@@ -7460,10 +7460,10 @@
       </p:pic>
       <p:pic>
         <p:nvPicPr>
-          <p:cNvPr id="6" name="Picture 5">
+          <p:cNvPr id="8" name="Picture 7">
             <a:extLst>
               <a:ext uri="{FF2B5EF4-FFF2-40B4-BE49-F238E27FC236}">
-                <a16:creationId xmlns:a16="http://schemas.microsoft.com/office/drawing/2014/main" id="{050DC5B5-7B27-4D0A-BB68-39B9E1795E0E}"/>
+                <a16:creationId xmlns:a16="http://schemas.microsoft.com/office/drawing/2014/main" id="{56A47B0C-E7D5-44A4-A394-BA331A152273}"/>
               </a:ext>
             </a:extLst>
           </p:cNvPr>
@@ -7478,8 +7478,8 @@
         </p:blipFill>
         <p:spPr>
           <a:xfrm>
-            <a:off x="6145490" y="783354"/>
-            <a:ext cx="5433060" cy="1313180"/>
+            <a:off x="5052783" y="775554"/>
+            <a:ext cx="6508115" cy="1668145"/>
           </a:xfrm>
           <a:prstGeom prst="rect">
             <a:avLst/>
@@ -7488,10 +7488,10 @@
       </p:pic>
       <p:pic>
         <p:nvPicPr>
-          <p:cNvPr id="7" name="Picture 6">
+          <p:cNvPr id="9" name="Picture 8">
             <a:extLst>
               <a:ext uri="{FF2B5EF4-FFF2-40B4-BE49-F238E27FC236}">
-                <a16:creationId xmlns:a16="http://schemas.microsoft.com/office/drawing/2014/main" id="{B1E6EC2F-D33E-472A-8C76-63E5C32AF632}"/>
+                <a16:creationId xmlns:a16="http://schemas.microsoft.com/office/drawing/2014/main" id="{B45363B9-9A6F-4D6A-B151-7D288B80247B}"/>
               </a:ext>
             </a:extLst>
           </p:cNvPr>
@@ -7506,8 +7506,8 @@
         </p:blipFill>
         <p:spPr>
           <a:xfrm>
-            <a:off x="6179271" y="2621924"/>
-            <a:ext cx="5381134" cy="1191218"/>
+            <a:off x="5090490" y="2553798"/>
+            <a:ext cx="6358363" cy="1394227"/>
           </a:xfrm>
           <a:prstGeom prst="rect">
             <a:avLst/>

</xml_diff>